<commit_message>
Jour 1 - Introduction fondamentaux
</commit_message>
<xml_diff>
--- a/slides/fr/Jour 1_Introduction_Fondamentaux.pptx
+++ b/slides/fr/Jour 1_Introduction_Fondamentaux.pptx
@@ -4076,14 +4076,14 @@
         </p:nvSpPr>
         <p:spPr/>
         <p:txBody>
-          <a:bodyPr>
+          <a:bodyPr anchor="ctr">
             <a:noAutofit/>
           </a:bodyPr>
           <a:lstStyle/>
           <a:p>
             <a:r>
-              <a:rPr lang="fr-FR" sz="4800" b="1"/>
-              <a:t>Analyse économétrique de données spatiales pour évaluer l'impact de politiques et de projets</a:t>
+              <a:rPr lang="fr-FR" sz="4800" b="1" dirty="0"/>
+              <a:t>Formation aux méthodes d’évaluation d’impact scientifiques</a:t>
             </a:r>
           </a:p>
         </p:txBody>

</xml_diff>

<commit_message>
slides mentionnant l'environnement technique
</commit_message>
<xml_diff>
--- a/slides/fr/Jour 1_Introduction_Fondamentaux.pptx
+++ b/slides/fr/Jour 1_Introduction_Fondamentaux.pptx
@@ -5,7 +5,7 @@
     <p:sldMasterId id="2147483648" r:id="rId1"/>
   </p:sldMasterIdLst>
   <p:notesMasterIdLst>
-    <p:notesMasterId r:id="rId28"/>
+    <p:notesMasterId r:id="rId29"/>
   </p:notesMasterIdLst>
   <p:sldIdLst>
     <p:sldId id="256" r:id="rId2"/>
@@ -15,25 +15,26 @@
     <p:sldId id="308" r:id="rId6"/>
     <p:sldId id="262" r:id="rId7"/>
     <p:sldId id="260" r:id="rId8"/>
-    <p:sldId id="263" r:id="rId9"/>
-    <p:sldId id="257" r:id="rId10"/>
-    <p:sldId id="261" r:id="rId11"/>
-    <p:sldId id="267" r:id="rId12"/>
-    <p:sldId id="264" r:id="rId13"/>
-    <p:sldId id="265" r:id="rId14"/>
-    <p:sldId id="268" r:id="rId15"/>
-    <p:sldId id="269" r:id="rId16"/>
-    <p:sldId id="270" r:id="rId17"/>
-    <p:sldId id="271" r:id="rId18"/>
-    <p:sldId id="273" r:id="rId19"/>
-    <p:sldId id="274" r:id="rId20"/>
-    <p:sldId id="275" r:id="rId21"/>
-    <p:sldId id="301" r:id="rId22"/>
-    <p:sldId id="272" r:id="rId23"/>
-    <p:sldId id="283" r:id="rId24"/>
-    <p:sldId id="278" r:id="rId25"/>
-    <p:sldId id="279" r:id="rId26"/>
-    <p:sldId id="284" r:id="rId27"/>
+    <p:sldId id="309" r:id="rId9"/>
+    <p:sldId id="263" r:id="rId10"/>
+    <p:sldId id="257" r:id="rId11"/>
+    <p:sldId id="261" r:id="rId12"/>
+    <p:sldId id="267" r:id="rId13"/>
+    <p:sldId id="264" r:id="rId14"/>
+    <p:sldId id="265" r:id="rId15"/>
+    <p:sldId id="268" r:id="rId16"/>
+    <p:sldId id="269" r:id="rId17"/>
+    <p:sldId id="270" r:id="rId18"/>
+    <p:sldId id="271" r:id="rId19"/>
+    <p:sldId id="273" r:id="rId20"/>
+    <p:sldId id="274" r:id="rId21"/>
+    <p:sldId id="275" r:id="rId22"/>
+    <p:sldId id="301" r:id="rId23"/>
+    <p:sldId id="272" r:id="rId24"/>
+    <p:sldId id="283" r:id="rId25"/>
+    <p:sldId id="278" r:id="rId26"/>
+    <p:sldId id="279" r:id="rId27"/>
+    <p:sldId id="284" r:id="rId28"/>
   </p:sldIdLst>
   <p:sldSz cx="12192000" cy="6858000"/>
   <p:notesSz cx="6858000" cy="9144000"/>
@@ -222,7 +223,7 @@
           <a:p>
             <a:fld id="{382B4D05-7B27-4ACA-B390-629921E58724}" type="datetimeFigureOut">
               <a:rPr lang="fr-FR" smtClean="0"/>
-              <a:t>30/06/2025</a:t>
+              <a:t>01/07/2025</a:t>
             </a:fld>
             <a:endParaRPr lang="fr-FR"/>
           </a:p>
@@ -644,7 +645,7 @@
           <a:p>
             <a:fld id="{378096CA-EF1E-4B8D-B873-3207C4F2DF8F}" type="slidenum">
               <a:rPr lang="fr-FR" smtClean="0"/>
-              <a:t>8</a:t>
+              <a:t>9</a:t>
             </a:fld>
             <a:endParaRPr lang="fr-FR"/>
           </a:p>
@@ -731,7 +732,7 @@
           <a:p>
             <a:fld id="{378096CA-EF1E-4B8D-B873-3207C4F2DF8F}" type="slidenum">
               <a:rPr lang="fr-FR" smtClean="0"/>
-              <a:t>16</a:t>
+              <a:t>17</a:t>
             </a:fld>
             <a:endParaRPr lang="fr-FR"/>
           </a:p>
@@ -818,7 +819,7 @@
           <a:p>
             <a:fld id="{378096CA-EF1E-4B8D-B873-3207C4F2DF8F}" type="slidenum">
               <a:rPr lang="fr-FR" smtClean="0"/>
-              <a:t>22</a:t>
+              <a:t>23</a:t>
             </a:fld>
             <a:endParaRPr lang="fr-FR"/>
           </a:p>
@@ -984,7 +985,7 @@
           <a:p>
             <a:fld id="{858D3960-AD67-4093-BD43-25B40AABDC13}" type="datetimeFigureOut">
               <a:rPr lang="fr-FR" smtClean="0"/>
-              <a:t>30/06/2025</a:t>
+              <a:t>01/07/2025</a:t>
             </a:fld>
             <a:endParaRPr lang="fr-FR"/>
           </a:p>
@@ -1182,7 +1183,7 @@
           <a:p>
             <a:fld id="{858D3960-AD67-4093-BD43-25B40AABDC13}" type="datetimeFigureOut">
               <a:rPr lang="fr-FR" smtClean="0"/>
-              <a:t>30/06/2025</a:t>
+              <a:t>01/07/2025</a:t>
             </a:fld>
             <a:endParaRPr lang="fr-FR"/>
           </a:p>
@@ -1390,7 +1391,7 @@
           <a:p>
             <a:fld id="{858D3960-AD67-4093-BD43-25B40AABDC13}" type="datetimeFigureOut">
               <a:rPr lang="fr-FR" smtClean="0"/>
-              <a:t>30/06/2025</a:t>
+              <a:t>01/07/2025</a:t>
             </a:fld>
             <a:endParaRPr lang="fr-FR"/>
           </a:p>
@@ -1588,7 +1589,7 @@
           <a:p>
             <a:fld id="{858D3960-AD67-4093-BD43-25B40AABDC13}" type="datetimeFigureOut">
               <a:rPr lang="fr-FR" smtClean="0"/>
-              <a:t>30/06/2025</a:t>
+              <a:t>01/07/2025</a:t>
             </a:fld>
             <a:endParaRPr lang="fr-FR"/>
           </a:p>
@@ -1867,7 +1868,7 @@
           <a:p>
             <a:fld id="{858D3960-AD67-4093-BD43-25B40AABDC13}" type="datetimeFigureOut">
               <a:rPr lang="fr-FR" smtClean="0"/>
-              <a:t>30/06/2025</a:t>
+              <a:t>01/07/2025</a:t>
             </a:fld>
             <a:endParaRPr lang="fr-FR"/>
           </a:p>
@@ -2132,7 +2133,7 @@
           <a:p>
             <a:fld id="{858D3960-AD67-4093-BD43-25B40AABDC13}" type="datetimeFigureOut">
               <a:rPr lang="fr-FR" smtClean="0"/>
-              <a:t>30/06/2025</a:t>
+              <a:t>01/07/2025</a:t>
             </a:fld>
             <a:endParaRPr lang="fr-FR"/>
           </a:p>
@@ -2544,7 +2545,7 @@
           <a:p>
             <a:fld id="{858D3960-AD67-4093-BD43-25B40AABDC13}" type="datetimeFigureOut">
               <a:rPr lang="fr-FR" smtClean="0"/>
-              <a:t>30/06/2025</a:t>
+              <a:t>01/07/2025</a:t>
             </a:fld>
             <a:endParaRPr lang="fr-FR"/>
           </a:p>
@@ -2685,7 +2686,7 @@
           <a:p>
             <a:fld id="{858D3960-AD67-4093-BD43-25B40AABDC13}" type="datetimeFigureOut">
               <a:rPr lang="fr-FR" smtClean="0"/>
-              <a:t>30/06/2025</a:t>
+              <a:t>01/07/2025</a:t>
             </a:fld>
             <a:endParaRPr lang="fr-FR"/>
           </a:p>
@@ -2798,7 +2799,7 @@
           <a:p>
             <a:fld id="{858D3960-AD67-4093-BD43-25B40AABDC13}" type="datetimeFigureOut">
               <a:rPr lang="fr-FR" smtClean="0"/>
-              <a:t>30/06/2025</a:t>
+              <a:t>01/07/2025</a:t>
             </a:fld>
             <a:endParaRPr lang="fr-FR"/>
           </a:p>
@@ -3109,7 +3110,7 @@
           <a:p>
             <a:fld id="{858D3960-AD67-4093-BD43-25B40AABDC13}" type="datetimeFigureOut">
               <a:rPr lang="fr-FR" smtClean="0"/>
-              <a:t>30/06/2025</a:t>
+              <a:t>01/07/2025</a:t>
             </a:fld>
             <a:endParaRPr lang="fr-FR"/>
           </a:p>
@@ -3397,7 +3398,7 @@
           <a:p>
             <a:fld id="{858D3960-AD67-4093-BD43-25B40AABDC13}" type="datetimeFigureOut">
               <a:rPr lang="fr-FR" smtClean="0"/>
-              <a:t>30/06/2025</a:t>
+              <a:t>01/07/2025</a:t>
             </a:fld>
             <a:endParaRPr lang="fr-FR"/>
           </a:p>
@@ -3638,7 +3639,7 @@
           <a:p>
             <a:fld id="{858D3960-AD67-4093-BD43-25B40AABDC13}" type="datetimeFigureOut">
               <a:rPr lang="fr-FR" smtClean="0"/>
-              <a:t>30/06/2025</a:t>
+              <a:t>01/07/2025</a:t>
             </a:fld>
             <a:endParaRPr lang="fr-FR"/>
           </a:p>
@@ -4305,10 +4306,10 @@
       </p:grpSpPr>
       <p:sp>
         <p:nvSpPr>
-          <p:cNvPr id="4" name="Titre 3">
-            <a:extLst>
-              <a:ext uri="{FF2B5EF4-FFF2-40B4-BE49-F238E27FC236}">
-                <a16:creationId xmlns:a16="http://schemas.microsoft.com/office/drawing/2014/main" id="{5B922C7D-6B1B-BF9B-33ED-7AFE1F661739}"/>
+          <p:cNvPr id="2" name="Titre 1">
+            <a:extLst>
+              <a:ext uri="{FF2B5EF4-FFF2-40B4-BE49-F238E27FC236}">
+                <a16:creationId xmlns:a16="http://schemas.microsoft.com/office/drawing/2014/main" id="{B6AB6C78-2C2A-B682-BA50-025D58CE21AD}"/>
               </a:ext>
             </a:extLst>
           </p:cNvPr>
@@ -4328,18 +4329,18 @@
           <a:lstStyle/>
           <a:p>
             <a:r>
-              <a:rPr lang="fr-FR" dirty="0"/>
-              <a:t>Spécificités de l’évaluation d’impact scientifique</a:t>
-            </a:r>
-          </a:p>
-        </p:txBody>
-      </p:sp>
-      <p:sp>
-        <p:nvSpPr>
-          <p:cNvPr id="5" name="Espace réservé du texte 4">
-            <a:extLst>
-              <a:ext uri="{FF2B5EF4-FFF2-40B4-BE49-F238E27FC236}">
-                <a16:creationId xmlns:a16="http://schemas.microsoft.com/office/drawing/2014/main" id="{C497FE61-0F03-5032-7C2E-0226D3C68734}"/>
+              <a:rPr lang="fr-FR"/>
+              <a:t>Objectifs de cette session</a:t>
+            </a:r>
+          </a:p>
+        </p:txBody>
+      </p:sp>
+      <p:sp>
+        <p:nvSpPr>
+          <p:cNvPr id="3" name="Espace réservé du contenu 2">
+            <a:extLst>
+              <a:ext uri="{FF2B5EF4-FFF2-40B4-BE49-F238E27FC236}">
+                <a16:creationId xmlns:a16="http://schemas.microsoft.com/office/drawing/2014/main" id="{CE7FACAB-468A-6B2C-3515-E9FBE64AA8DA}"/>
               </a:ext>
             </a:extLst>
           </p:cNvPr>
@@ -4347,7 +4348,7 @@
             <a:spLocks noGrp="1"/>
           </p:cNvSpPr>
           <p:nvPr>
-            <p:ph type="body" idx="1"/>
+            <p:ph idx="1"/>
             <p:custDataLst>
               <p:tags r:id="rId2"/>
             </p:custDataLst>
@@ -4358,14 +4359,41 @@
           <a:bodyPr/>
           <a:lstStyle/>
           <a:p>
-            <a:endParaRPr lang="fr-FR"/>
+            <a:r>
+              <a:rPr lang="fr-FR"/>
+              <a:t>Spécificité des évaluations d’impact dans la « boite à outils » évaluative</a:t>
+            </a:r>
+          </a:p>
+          <a:p>
+            <a:r>
+              <a:rPr lang="fr-FR"/>
+              <a:t>Enjeux de l’évaluation d’impact</a:t>
+            </a:r>
+          </a:p>
+          <a:p>
+            <a:r>
+              <a:rPr lang="fr-FR"/>
+              <a:t>Cadre d’analyse économétrique de la causalité : le cadre des résultats potentiels de Rubin</a:t>
+            </a:r>
+          </a:p>
+          <a:p>
+            <a:r>
+              <a:rPr lang="fr-FR"/>
+              <a:t>Affiner sa compréhension des mécanismes de causalité : diagrammes acycliques orientés et combinaisons quanti-quali</a:t>
+            </a:r>
+          </a:p>
+          <a:p>
+            <a:r>
+              <a:rPr lang="fr-FR"/>
+              <a:t>Tour d’horizon des principales méthodes d’évaluation d’impact </a:t>
+            </a:r>
           </a:p>
         </p:txBody>
       </p:sp>
     </p:spTree>
     <p:extLst>
       <p:ext uri="{BB962C8B-B14F-4D97-AF65-F5344CB8AC3E}">
-        <p14:creationId xmlns:p14="http://schemas.microsoft.com/office/powerpoint/2010/main" val="623807200"/>
+        <p14:creationId xmlns:p14="http://schemas.microsoft.com/office/powerpoint/2010/main" val="2053272106"/>
       </p:ext>
     </p:extLst>
   </p:cSld>
@@ -4397,6 +4425,95 @@
           <p:cNvPr id="4" name="Titre 3">
             <a:extLst>
               <a:ext uri="{FF2B5EF4-FFF2-40B4-BE49-F238E27FC236}">
+                <a16:creationId xmlns:a16="http://schemas.microsoft.com/office/drawing/2014/main" id="{5B922C7D-6B1B-BF9B-33ED-7AFE1F661739}"/>
+              </a:ext>
+            </a:extLst>
+          </p:cNvPr>
+          <p:cNvSpPr>
+            <a:spLocks noGrp="1"/>
+          </p:cNvSpPr>
+          <p:nvPr>
+            <p:ph type="title"/>
+            <p:custDataLst>
+              <p:tags r:id="rId1"/>
+            </p:custDataLst>
+          </p:nvPr>
+        </p:nvSpPr>
+        <p:spPr/>
+        <p:txBody>
+          <a:bodyPr/>
+          <a:lstStyle/>
+          <a:p>
+            <a:r>
+              <a:rPr lang="fr-FR" dirty="0"/>
+              <a:t>Spécificités de l’évaluation d’impact scientifique</a:t>
+            </a:r>
+          </a:p>
+        </p:txBody>
+      </p:sp>
+      <p:sp>
+        <p:nvSpPr>
+          <p:cNvPr id="5" name="Espace réservé du texte 4">
+            <a:extLst>
+              <a:ext uri="{FF2B5EF4-FFF2-40B4-BE49-F238E27FC236}">
+                <a16:creationId xmlns:a16="http://schemas.microsoft.com/office/drawing/2014/main" id="{C497FE61-0F03-5032-7C2E-0226D3C68734}"/>
+              </a:ext>
+            </a:extLst>
+          </p:cNvPr>
+          <p:cNvSpPr>
+            <a:spLocks noGrp="1"/>
+          </p:cNvSpPr>
+          <p:nvPr>
+            <p:ph type="body" idx="1"/>
+            <p:custDataLst>
+              <p:tags r:id="rId2"/>
+            </p:custDataLst>
+          </p:nvPr>
+        </p:nvSpPr>
+        <p:spPr/>
+        <p:txBody>
+          <a:bodyPr/>
+          <a:lstStyle/>
+          <a:p>
+            <a:endParaRPr lang="fr-FR"/>
+          </a:p>
+        </p:txBody>
+      </p:sp>
+    </p:spTree>
+    <p:extLst>
+      <p:ext uri="{BB962C8B-B14F-4D97-AF65-F5344CB8AC3E}">
+        <p14:creationId xmlns:p14="http://schemas.microsoft.com/office/powerpoint/2010/main" val="623807200"/>
+      </p:ext>
+    </p:extLst>
+  </p:cSld>
+  <p:clrMapOvr>
+    <a:masterClrMapping/>
+  </p:clrMapOvr>
+</p:sld>
+</file>
+
+<file path=ppt/slides/slide12.xml><?xml version="1.0" encoding="utf-8"?>
+<p:sld xmlns:a="http://schemas.openxmlformats.org/drawingml/2006/main" xmlns:r="http://schemas.openxmlformats.org/officeDocument/2006/relationships" xmlns:p="http://schemas.openxmlformats.org/presentationml/2006/main">
+  <p:cSld>
+    <p:spTree>
+      <p:nvGrpSpPr>
+        <p:cNvPr id="1" name=""/>
+        <p:cNvGrpSpPr/>
+        <p:nvPr/>
+      </p:nvGrpSpPr>
+      <p:grpSpPr>
+        <a:xfrm>
+          <a:off x="0" y="0"/>
+          <a:ext cx="0" cy="0"/>
+          <a:chOff x="0" y="0"/>
+          <a:chExt cx="0" cy="0"/>
+        </a:xfrm>
+      </p:grpSpPr>
+      <p:sp>
+        <p:nvSpPr>
+          <p:cNvPr id="4" name="Titre 3">
+            <a:extLst>
+              <a:ext uri="{FF2B5EF4-FFF2-40B4-BE49-F238E27FC236}">
                 <a16:creationId xmlns:a16="http://schemas.microsoft.com/office/drawing/2014/main" id="{1D0C68DA-286D-E6F5-C06F-066616F2B7CD}"/>
               </a:ext>
             </a:extLst>
@@ -4501,7 +4618,7 @@
 </p:sld>
 </file>
 
-<file path=ppt/slides/slide12.xml><?xml version="1.0" encoding="utf-8"?>
+<file path=ppt/slides/slide13.xml><?xml version="1.0" encoding="utf-8"?>
 <p:sld xmlns:a="http://schemas.openxmlformats.org/drawingml/2006/main" xmlns:r="http://schemas.openxmlformats.org/officeDocument/2006/relationships" xmlns:p="http://schemas.openxmlformats.org/presentationml/2006/main">
   <p:cSld>
     <p:spTree>
@@ -5780,7 +5897,7 @@
 </p:sld>
 </file>
 
-<file path=ppt/slides/slide13.xml><?xml version="1.0" encoding="utf-8"?>
+<file path=ppt/slides/slide14.xml><?xml version="1.0" encoding="utf-8"?>
 <p:sld xmlns:a="http://schemas.openxmlformats.org/drawingml/2006/main" xmlns:r="http://schemas.openxmlformats.org/officeDocument/2006/relationships" xmlns:p="http://schemas.openxmlformats.org/presentationml/2006/main">
   <p:cSld>
     <p:spTree>
@@ -8092,7 +8209,7 @@
             </a:pPr>
             <a:fld id="{F9B19538-8328-489B-B6DE-FCE852F32308}" type="datetime1">
               <a:rPr lang="fr-FR" smtClean="0"/>
-              <a:t>30/06/2025</a:t>
+              <a:t>01/07/2025</a:t>
             </a:fld>
             <a:endParaRPr lang="fr-FR"/>
           </a:p>
@@ -9909,354 +10026,6 @@
 </p:sld>
 </file>
 
-<file path=ppt/slides/slide14.xml><?xml version="1.0" encoding="utf-8"?>
-<p:sld xmlns:a="http://schemas.openxmlformats.org/drawingml/2006/main" xmlns:r="http://schemas.openxmlformats.org/officeDocument/2006/relationships" xmlns:p="http://schemas.openxmlformats.org/presentationml/2006/main">
-  <p:cSld>
-    <p:spTree>
-      <p:nvGrpSpPr>
-        <p:cNvPr id="1" name=""/>
-        <p:cNvGrpSpPr/>
-        <p:nvPr/>
-      </p:nvGrpSpPr>
-      <p:grpSpPr>
-        <a:xfrm>
-          <a:off x="0" y="0"/>
-          <a:ext cx="0" cy="0"/>
-          <a:chOff x="0" y="0"/>
-          <a:chExt cx="0" cy="0"/>
-        </a:xfrm>
-      </p:grpSpPr>
-      <p:sp>
-        <p:nvSpPr>
-          <p:cNvPr id="10" name="Titre 9">
-            <a:extLst>
-              <a:ext uri="{FF2B5EF4-FFF2-40B4-BE49-F238E27FC236}">
-                <a16:creationId xmlns:a16="http://schemas.microsoft.com/office/drawing/2014/main" id="{058BE735-A0D1-03BD-D1EC-41A61B9E662B}"/>
-              </a:ext>
-            </a:extLst>
-          </p:cNvPr>
-          <p:cNvSpPr>
-            <a:spLocks noGrp="1"/>
-          </p:cNvSpPr>
-          <p:nvPr>
-            <p:ph type="title"/>
-            <p:custDataLst>
-              <p:tags r:id="rId1"/>
-            </p:custDataLst>
-          </p:nvPr>
-        </p:nvSpPr>
-        <p:spPr/>
-        <p:txBody>
-          <a:bodyPr/>
-          <a:lstStyle/>
-          <a:p>
-            <a:r>
-              <a:rPr lang="fr-FR"/>
-              <a:t>Différentes acceptions de l’impact</a:t>
-            </a:r>
-          </a:p>
-        </p:txBody>
-      </p:sp>
-      <p:sp>
-        <p:nvSpPr>
-          <p:cNvPr id="11" name="Espace réservé du texte 10">
-            <a:extLst>
-              <a:ext uri="{FF2B5EF4-FFF2-40B4-BE49-F238E27FC236}">
-                <a16:creationId xmlns:a16="http://schemas.microsoft.com/office/drawing/2014/main" id="{592E88BE-32E0-B2EB-7FA6-B49F5DD6FE66}"/>
-              </a:ext>
-            </a:extLst>
-          </p:cNvPr>
-          <p:cNvSpPr>
-            <a:spLocks noGrp="1"/>
-          </p:cNvSpPr>
-          <p:nvPr>
-            <p:ph type="body" idx="1"/>
-            <p:custDataLst>
-              <p:tags r:id="rId2"/>
-            </p:custDataLst>
-          </p:nvPr>
-        </p:nvSpPr>
-        <p:spPr/>
-        <p:txBody>
-          <a:bodyPr>
-            <a:normAutofit/>
-          </a:bodyPr>
-          <a:lstStyle/>
-          <a:p>
-            <a:r>
-              <a:rPr lang="fr-FR"/>
-              <a:t>Approche classique de l’évaluation du développement</a:t>
-            </a:r>
-          </a:p>
-        </p:txBody>
-      </p:sp>
-      <p:sp>
-        <p:nvSpPr>
-          <p:cNvPr id="12" name="Espace réservé du contenu 11">
-            <a:extLst>
-              <a:ext uri="{FF2B5EF4-FFF2-40B4-BE49-F238E27FC236}">
-                <a16:creationId xmlns:a16="http://schemas.microsoft.com/office/drawing/2014/main" id="{0DF30545-3412-CCEA-8702-D6ABD92879B2}"/>
-              </a:ext>
-            </a:extLst>
-          </p:cNvPr>
-          <p:cNvSpPr>
-            <a:spLocks noGrp="1"/>
-          </p:cNvSpPr>
-          <p:nvPr>
-            <p:ph sz="half" idx="2"/>
-            <p:custDataLst>
-              <p:tags r:id="rId3"/>
-            </p:custDataLst>
-          </p:nvPr>
-        </p:nvSpPr>
-        <p:spPr/>
-        <p:txBody>
-          <a:bodyPr>
-            <a:normAutofit fontScale="70000" lnSpcReduction="20000"/>
-          </a:bodyPr>
-          <a:lstStyle/>
-          <a:p>
-            <a:pPr>
-              <a:buFont typeface="Arial" panose="020B0604020202020204" pitchFamily="34" charset="0"/>
-              <a:buChar char="•"/>
-            </a:pPr>
-            <a:r>
-              <a:rPr lang="fr-FR" b="1"/>
-              <a:t>Définition</a:t>
-            </a:r>
-            <a:r>
-              <a:rPr lang="fr-FR"/>
-              <a:t> : « Mesure dans laquelle l’intervention a produit, ou devrait produire, des effets importants et de vaste portée, positifs ou négatifs, intentionnels ou non. » (CAD-OCDE, 2019) </a:t>
-            </a:r>
-          </a:p>
-          <a:p>
-            <a:pPr>
-              <a:buFont typeface="Arial" panose="020B0604020202020204" pitchFamily="34" charset="0"/>
-              <a:buChar char="•"/>
-            </a:pPr>
-            <a:r>
-              <a:rPr lang="fr-FR" b="1"/>
-              <a:t>Spécificités</a:t>
-            </a:r>
-            <a:r>
-              <a:rPr lang="fr-FR"/>
-              <a:t> :</a:t>
-            </a:r>
-          </a:p>
-          <a:p>
-            <a:pPr marL="742950" lvl="1" indent="-285750">
-              <a:buFont typeface="Arial" panose="020B0604020202020204" pitchFamily="34" charset="0"/>
-              <a:buChar char="•"/>
-            </a:pPr>
-            <a:r>
-              <a:rPr lang="fr-FR" sz="2900"/>
-              <a:t>Adopte une perspective </a:t>
-            </a:r>
-            <a:r>
-              <a:rPr lang="fr-FR" sz="2900" b="1"/>
-              <a:t>holistique</a:t>
-            </a:r>
-            <a:r>
-              <a:rPr lang="fr-FR" sz="2900"/>
-              <a:t>, englobant une gamme variée d'effets.</a:t>
-            </a:r>
-          </a:p>
-          <a:p>
-            <a:pPr marL="742950" lvl="1" indent="-285750">
-              <a:buFont typeface="Arial" panose="020B0604020202020204" pitchFamily="34" charset="0"/>
-              <a:buChar char="•"/>
-            </a:pPr>
-            <a:r>
-              <a:rPr lang="fr-FR" sz="2900"/>
-              <a:t>Est orientée vers des effets </a:t>
-            </a:r>
-            <a:r>
-              <a:rPr lang="fr-FR" sz="2900" b="1"/>
-              <a:t>durables</a:t>
-            </a:r>
-            <a:r>
-              <a:rPr lang="fr-FR" sz="2900"/>
-              <a:t> et de </a:t>
-            </a:r>
-            <a:r>
-              <a:rPr lang="fr-FR" sz="2900" b="1"/>
-              <a:t>long terme</a:t>
-            </a:r>
-            <a:r>
-              <a:rPr lang="fr-FR" sz="2900"/>
-              <a:t>.</a:t>
-            </a:r>
-          </a:p>
-          <a:p>
-            <a:pPr marL="742950" lvl="1" indent="-285750">
-              <a:buFont typeface="Arial" panose="020B0604020202020204" pitchFamily="34" charset="0"/>
-              <a:buChar char="•"/>
-            </a:pPr>
-            <a:r>
-              <a:rPr lang="fr-FR" sz="2900"/>
-              <a:t>Reconnaît l'existence d'effets </a:t>
-            </a:r>
-            <a:r>
-              <a:rPr lang="fr-FR" sz="2900" b="1"/>
-              <a:t>non intentionnels</a:t>
-            </a:r>
-            <a:r>
-              <a:rPr lang="fr-FR" sz="2900"/>
-              <a:t>, qu'ils soient positifs ou négatifs.</a:t>
-            </a:r>
-          </a:p>
-        </p:txBody>
-      </p:sp>
-      <p:sp>
-        <p:nvSpPr>
-          <p:cNvPr id="13" name="Espace réservé du texte 12">
-            <a:extLst>
-              <a:ext uri="{FF2B5EF4-FFF2-40B4-BE49-F238E27FC236}">
-                <a16:creationId xmlns:a16="http://schemas.microsoft.com/office/drawing/2014/main" id="{396CA74F-36E3-EE32-E082-709E06FD8859}"/>
-              </a:ext>
-            </a:extLst>
-          </p:cNvPr>
-          <p:cNvSpPr>
-            <a:spLocks noGrp="1"/>
-          </p:cNvSpPr>
-          <p:nvPr>
-            <p:ph type="body" sz="quarter" idx="3"/>
-            <p:custDataLst>
-              <p:tags r:id="rId4"/>
-            </p:custDataLst>
-          </p:nvPr>
-        </p:nvSpPr>
-        <p:spPr/>
-        <p:txBody>
-          <a:bodyPr>
-            <a:normAutofit/>
-          </a:bodyPr>
-          <a:lstStyle/>
-          <a:p>
-            <a:r>
-              <a:rPr lang="fr-FR"/>
-              <a:t>Approches scientifiques (en particulier économétriques)</a:t>
-            </a:r>
-          </a:p>
-        </p:txBody>
-      </p:sp>
-      <p:sp>
-        <p:nvSpPr>
-          <p:cNvPr id="14" name="Espace réservé du contenu 13">
-            <a:extLst>
-              <a:ext uri="{FF2B5EF4-FFF2-40B4-BE49-F238E27FC236}">
-                <a16:creationId xmlns:a16="http://schemas.microsoft.com/office/drawing/2014/main" id="{441B42C4-1058-8CEC-19CC-8A9698A54A66}"/>
-              </a:ext>
-            </a:extLst>
-          </p:cNvPr>
-          <p:cNvSpPr>
-            <a:spLocks noGrp="1"/>
-          </p:cNvSpPr>
-          <p:nvPr>
-            <p:ph sz="quarter" idx="4"/>
-            <p:custDataLst>
-              <p:tags r:id="rId5"/>
-            </p:custDataLst>
-          </p:nvPr>
-        </p:nvSpPr>
-        <p:spPr/>
-        <p:txBody>
-          <a:bodyPr>
-            <a:normAutofit fontScale="70000" lnSpcReduction="20000"/>
-          </a:bodyPr>
-          <a:lstStyle/>
-          <a:p>
-            <a:pPr>
-              <a:buFont typeface="Arial" panose="020B0604020202020204" pitchFamily="34" charset="0"/>
-              <a:buChar char="•"/>
-            </a:pPr>
-            <a:r>
-              <a:rPr lang="fr-FR" b="1"/>
-              <a:t>Définition</a:t>
-            </a:r>
-            <a:r>
-              <a:rPr lang="fr-FR"/>
-              <a:t> : « La différence entre le résultat observé avec l'intervention et le résultat qui aurait été observé sans elle. » (Angrist et Pischke, 2009)</a:t>
-            </a:r>
-          </a:p>
-          <a:p>
-            <a:pPr>
-              <a:buFont typeface="Arial" panose="020B0604020202020204" pitchFamily="34" charset="0"/>
-              <a:buChar char="•"/>
-            </a:pPr>
-            <a:r>
-              <a:rPr lang="fr-FR" b="1"/>
-              <a:t>Spécificités</a:t>
-            </a:r>
-            <a:r>
-              <a:rPr lang="fr-FR"/>
-              <a:t> :</a:t>
-            </a:r>
-          </a:p>
-          <a:p>
-            <a:pPr marL="742950" lvl="1" indent="-285750">
-              <a:buFont typeface="Arial" panose="020B0604020202020204" pitchFamily="34" charset="0"/>
-              <a:buChar char="•"/>
-            </a:pPr>
-            <a:r>
-              <a:rPr lang="fr-FR" sz="2900"/>
-              <a:t>Se focalise sur des effets </a:t>
-            </a:r>
-            <a:r>
-              <a:rPr lang="fr-FR" sz="2900" b="1"/>
-              <a:t>à court terme</a:t>
-            </a:r>
-            <a:r>
-              <a:rPr lang="fr-FR" sz="2900"/>
-              <a:t> : relèvent souvent de l'éfficacit.</a:t>
-            </a:r>
-          </a:p>
-          <a:p>
-            <a:pPr marL="742950" lvl="1" indent="-285750">
-              <a:buFont typeface="Arial" panose="020B0604020202020204" pitchFamily="34" charset="0"/>
-              <a:buChar char="•"/>
-            </a:pPr>
-            <a:r>
-              <a:rPr lang="fr-FR" sz="2900"/>
-              <a:t>Adopte une rigueur méthodologique pour isoler l'effet de l'intervention des autres facteurs.</a:t>
-            </a:r>
-          </a:p>
-          <a:p>
-            <a:pPr marL="742950" lvl="1" indent="-285750">
-              <a:buFont typeface="Arial" panose="020B0604020202020204" pitchFamily="34" charset="0"/>
-              <a:buChar char="•"/>
-            </a:pPr>
-            <a:r>
-              <a:rPr lang="fr-FR" sz="2900"/>
-              <a:t>Priorise la </a:t>
-            </a:r>
-            <a:r>
-              <a:rPr lang="fr-FR" sz="2900" b="1"/>
-              <a:t>causalité</a:t>
-            </a:r>
-            <a:r>
-              <a:rPr lang="fr-FR" sz="2900"/>
-              <a:t>, cherchant à déterminer les effets directs et mesurables d'une action.</a:t>
-            </a:r>
-          </a:p>
-          <a:p>
-            <a:endParaRPr lang="fr-FR"/>
-          </a:p>
-        </p:txBody>
-      </p:sp>
-    </p:spTree>
-    <p:extLst>
-      <p:ext uri="{BB962C8B-B14F-4D97-AF65-F5344CB8AC3E}">
-        <p14:creationId xmlns:p14="http://schemas.microsoft.com/office/powerpoint/2010/main" val="1150898721"/>
-      </p:ext>
-    </p:extLst>
-  </p:cSld>
-  <p:clrMapOvr>
-    <a:masterClrMapping/>
-  </p:clrMapOvr>
-</p:sld>
-</file>
-
 <file path=ppt/slides/slide15.xml><?xml version="1.0" encoding="utf-8"?>
 <p:sld xmlns:a="http://schemas.openxmlformats.org/drawingml/2006/main" xmlns:r="http://schemas.openxmlformats.org/officeDocument/2006/relationships" xmlns:p="http://schemas.openxmlformats.org/presentationml/2006/main">
   <p:cSld>
@@ -10276,10 +10045,10 @@
       </p:grpSpPr>
       <p:sp>
         <p:nvSpPr>
-          <p:cNvPr id="7" name="Titre 6">
-            <a:extLst>
-              <a:ext uri="{FF2B5EF4-FFF2-40B4-BE49-F238E27FC236}">
-                <a16:creationId xmlns:a16="http://schemas.microsoft.com/office/drawing/2014/main" id="{E400F466-A91D-D2CA-B1E2-E0C18A1B3FDF}"/>
+          <p:cNvPr id="10" name="Titre 9">
+            <a:extLst>
+              <a:ext uri="{FF2B5EF4-FFF2-40B4-BE49-F238E27FC236}">
+                <a16:creationId xmlns:a16="http://schemas.microsoft.com/office/drawing/2014/main" id="{058BE735-A0D1-03BD-D1EC-41A61B9E662B}"/>
               </a:ext>
             </a:extLst>
           </p:cNvPr>
@@ -10293,32 +10062,57 @@
             </p:custDataLst>
           </p:nvPr>
         </p:nvSpPr>
-        <p:spPr>
-          <a:xfrm>
-            <a:off x="831850" y="1709739"/>
-            <a:ext cx="10515600" cy="2232342"/>
-          </a:xfrm>
-        </p:spPr>
+        <p:spPr/>
+        <p:txBody>
+          <a:bodyPr/>
+          <a:lstStyle/>
+          <a:p>
+            <a:r>
+              <a:rPr lang="fr-FR"/>
+              <a:t>Différentes acceptions de l’impact</a:t>
+            </a:r>
+          </a:p>
+        </p:txBody>
+      </p:sp>
+      <p:sp>
+        <p:nvSpPr>
+          <p:cNvPr id="11" name="Espace réservé du texte 10">
+            <a:extLst>
+              <a:ext uri="{FF2B5EF4-FFF2-40B4-BE49-F238E27FC236}">
+                <a16:creationId xmlns:a16="http://schemas.microsoft.com/office/drawing/2014/main" id="{592E88BE-32E0-B2EB-7FA6-B49F5DD6FE66}"/>
+              </a:ext>
+            </a:extLst>
+          </p:cNvPr>
+          <p:cNvSpPr>
+            <a:spLocks noGrp="1"/>
+          </p:cNvSpPr>
+          <p:nvPr>
+            <p:ph type="body" idx="1"/>
+            <p:custDataLst>
+              <p:tags r:id="rId2"/>
+            </p:custDataLst>
+          </p:nvPr>
+        </p:nvSpPr>
+        <p:spPr/>
         <p:txBody>
           <a:bodyPr>
             <a:normAutofit/>
           </a:bodyPr>
           <a:lstStyle/>
           <a:p>
-            <a:pPr algn="ctr"/>
-            <a:r>
-              <a:rPr lang="fr-FR" sz="4800"/>
-              <a:t>Discussion</a:t>
-            </a:r>
-          </a:p>
-        </p:txBody>
-      </p:sp>
-      <p:sp>
-        <p:nvSpPr>
-          <p:cNvPr id="8" name="Espace réservé du texte 7">
-            <a:extLst>
-              <a:ext uri="{FF2B5EF4-FFF2-40B4-BE49-F238E27FC236}">
-                <a16:creationId xmlns:a16="http://schemas.microsoft.com/office/drawing/2014/main" id="{8BA47168-526C-482B-4A6D-E14A0C0A3BF9}"/>
+            <a:r>
+              <a:rPr lang="fr-FR"/>
+              <a:t>Approche classique de l’évaluation du développement</a:t>
+            </a:r>
+          </a:p>
+        </p:txBody>
+      </p:sp>
+      <p:sp>
+        <p:nvSpPr>
+          <p:cNvPr id="12" name="Espace réservé du contenu 11">
+            <a:extLst>
+              <a:ext uri="{FF2B5EF4-FFF2-40B4-BE49-F238E27FC236}">
+                <a16:creationId xmlns:a16="http://schemas.microsoft.com/office/drawing/2014/main" id="{0DF30545-3412-CCEA-8702-D6ABD92879B2}"/>
               </a:ext>
             </a:extLst>
           </p:cNvPr>
@@ -10326,18 +10120,130 @@
             <a:spLocks noGrp="1"/>
           </p:cNvSpPr>
           <p:nvPr>
-            <p:ph type="body" idx="1"/>
+            <p:ph sz="half" idx="2"/>
             <p:custDataLst>
-              <p:tags r:id="rId2"/>
+              <p:tags r:id="rId3"/>
             </p:custDataLst>
           </p:nvPr>
         </p:nvSpPr>
-        <p:spPr>
-          <a:xfrm>
-            <a:off x="831850" y="4589463"/>
-            <a:ext cx="10515600" cy="1500187"/>
-          </a:xfrm>
-        </p:spPr>
+        <p:spPr/>
+        <p:txBody>
+          <a:bodyPr>
+            <a:normAutofit fontScale="70000" lnSpcReduction="20000"/>
+          </a:bodyPr>
+          <a:lstStyle/>
+          <a:p>
+            <a:pPr>
+              <a:buFont typeface="Arial" panose="020B0604020202020204" pitchFamily="34" charset="0"/>
+              <a:buChar char="•"/>
+            </a:pPr>
+            <a:r>
+              <a:rPr lang="fr-FR" b="1"/>
+              <a:t>Définition</a:t>
+            </a:r>
+            <a:r>
+              <a:rPr lang="fr-FR"/>
+              <a:t> : « Mesure dans laquelle l’intervention a produit, ou devrait produire, des effets importants et de vaste portée, positifs ou négatifs, intentionnels ou non. » (CAD-OCDE, 2019) </a:t>
+            </a:r>
+          </a:p>
+          <a:p>
+            <a:pPr>
+              <a:buFont typeface="Arial" panose="020B0604020202020204" pitchFamily="34" charset="0"/>
+              <a:buChar char="•"/>
+            </a:pPr>
+            <a:r>
+              <a:rPr lang="fr-FR" b="1"/>
+              <a:t>Spécificités</a:t>
+            </a:r>
+            <a:r>
+              <a:rPr lang="fr-FR"/>
+              <a:t> :</a:t>
+            </a:r>
+          </a:p>
+          <a:p>
+            <a:pPr marL="742950" lvl="1" indent="-285750">
+              <a:buFont typeface="Arial" panose="020B0604020202020204" pitchFamily="34" charset="0"/>
+              <a:buChar char="•"/>
+            </a:pPr>
+            <a:r>
+              <a:rPr lang="fr-FR" sz="2900"/>
+              <a:t>Adopte une perspective </a:t>
+            </a:r>
+            <a:r>
+              <a:rPr lang="fr-FR" sz="2900" b="1"/>
+              <a:t>holistique</a:t>
+            </a:r>
+            <a:r>
+              <a:rPr lang="fr-FR" sz="2900"/>
+              <a:t>, englobant une gamme variée d'effets.</a:t>
+            </a:r>
+          </a:p>
+          <a:p>
+            <a:pPr marL="742950" lvl="1" indent="-285750">
+              <a:buFont typeface="Arial" panose="020B0604020202020204" pitchFamily="34" charset="0"/>
+              <a:buChar char="•"/>
+            </a:pPr>
+            <a:r>
+              <a:rPr lang="fr-FR" sz="2900"/>
+              <a:t>Est orientée vers des effets </a:t>
+            </a:r>
+            <a:r>
+              <a:rPr lang="fr-FR" sz="2900" b="1"/>
+              <a:t>durables</a:t>
+            </a:r>
+            <a:r>
+              <a:rPr lang="fr-FR" sz="2900"/>
+              <a:t> et de </a:t>
+            </a:r>
+            <a:r>
+              <a:rPr lang="fr-FR" sz="2900" b="1"/>
+              <a:t>long terme</a:t>
+            </a:r>
+            <a:r>
+              <a:rPr lang="fr-FR" sz="2900"/>
+              <a:t>.</a:t>
+            </a:r>
+          </a:p>
+          <a:p>
+            <a:pPr marL="742950" lvl="1" indent="-285750">
+              <a:buFont typeface="Arial" panose="020B0604020202020204" pitchFamily="34" charset="0"/>
+              <a:buChar char="•"/>
+            </a:pPr>
+            <a:r>
+              <a:rPr lang="fr-FR" sz="2900"/>
+              <a:t>Reconnaît l'existence d'effets </a:t>
+            </a:r>
+            <a:r>
+              <a:rPr lang="fr-FR" sz="2900" b="1"/>
+              <a:t>non intentionnels</a:t>
+            </a:r>
+            <a:r>
+              <a:rPr lang="fr-FR" sz="2900"/>
+              <a:t>, qu'ils soient positifs ou négatifs.</a:t>
+            </a:r>
+          </a:p>
+        </p:txBody>
+      </p:sp>
+      <p:sp>
+        <p:nvSpPr>
+          <p:cNvPr id="13" name="Espace réservé du texte 12">
+            <a:extLst>
+              <a:ext uri="{FF2B5EF4-FFF2-40B4-BE49-F238E27FC236}">
+                <a16:creationId xmlns:a16="http://schemas.microsoft.com/office/drawing/2014/main" id="{396CA74F-36E3-EE32-E082-709E06FD8859}"/>
+              </a:ext>
+            </a:extLst>
+          </p:cNvPr>
+          <p:cNvSpPr>
+            <a:spLocks noGrp="1"/>
+          </p:cNvSpPr>
+          <p:nvPr>
+            <p:ph type="body" sz="quarter" idx="3"/>
+            <p:custDataLst>
+              <p:tags r:id="rId4"/>
+            </p:custDataLst>
+          </p:nvPr>
+        </p:nvSpPr>
+        <p:spPr/>
         <p:txBody>
           <a:bodyPr>
             <a:normAutofit/>
@@ -10345,23 +10251,120 @@
           <a:lstStyle/>
           <a:p>
             <a:r>
-              <a:rPr lang="fr-FR" sz="3200" i="1"/>
-              <a:t>Que pensez-vous de ces définitions de l’impact ? </a:t>
-            </a:r>
-          </a:p>
-          <a:p>
-            <a:r>
-              <a:rPr lang="fr-FR" sz="3200" i="1"/>
-              <a:t>Qu’est-ce qui manque selon vous ?</a:t>
-            </a:r>
-            <a:endParaRPr lang="fr-FR" sz="3200"/>
+              <a:rPr lang="fr-FR"/>
+              <a:t>Approches scientifiques (en particulier économétriques)</a:t>
+            </a:r>
+          </a:p>
+        </p:txBody>
+      </p:sp>
+      <p:sp>
+        <p:nvSpPr>
+          <p:cNvPr id="14" name="Espace réservé du contenu 13">
+            <a:extLst>
+              <a:ext uri="{FF2B5EF4-FFF2-40B4-BE49-F238E27FC236}">
+                <a16:creationId xmlns:a16="http://schemas.microsoft.com/office/drawing/2014/main" id="{441B42C4-1058-8CEC-19CC-8A9698A54A66}"/>
+              </a:ext>
+            </a:extLst>
+          </p:cNvPr>
+          <p:cNvSpPr>
+            <a:spLocks noGrp="1"/>
+          </p:cNvSpPr>
+          <p:nvPr>
+            <p:ph sz="quarter" idx="4"/>
+            <p:custDataLst>
+              <p:tags r:id="rId5"/>
+            </p:custDataLst>
+          </p:nvPr>
+        </p:nvSpPr>
+        <p:spPr/>
+        <p:txBody>
+          <a:bodyPr>
+            <a:normAutofit fontScale="70000" lnSpcReduction="20000"/>
+          </a:bodyPr>
+          <a:lstStyle/>
+          <a:p>
+            <a:pPr>
+              <a:buFont typeface="Arial" panose="020B0604020202020204" pitchFamily="34" charset="0"/>
+              <a:buChar char="•"/>
+            </a:pPr>
+            <a:r>
+              <a:rPr lang="fr-FR" b="1"/>
+              <a:t>Définition</a:t>
+            </a:r>
+            <a:r>
+              <a:rPr lang="fr-FR"/>
+              <a:t> : « La différence entre le résultat observé avec l'intervention et le résultat qui aurait été observé sans elle. » (Angrist et Pischke, 2009)</a:t>
+            </a:r>
+          </a:p>
+          <a:p>
+            <a:pPr>
+              <a:buFont typeface="Arial" panose="020B0604020202020204" pitchFamily="34" charset="0"/>
+              <a:buChar char="•"/>
+            </a:pPr>
+            <a:r>
+              <a:rPr lang="fr-FR" b="1"/>
+              <a:t>Spécificités</a:t>
+            </a:r>
+            <a:r>
+              <a:rPr lang="fr-FR"/>
+              <a:t> :</a:t>
+            </a:r>
+          </a:p>
+          <a:p>
+            <a:pPr marL="742950" lvl="1" indent="-285750">
+              <a:buFont typeface="Arial" panose="020B0604020202020204" pitchFamily="34" charset="0"/>
+              <a:buChar char="•"/>
+            </a:pPr>
+            <a:r>
+              <a:rPr lang="fr-FR" sz="2900"/>
+              <a:t>Se focalise sur des effets </a:t>
+            </a:r>
+            <a:r>
+              <a:rPr lang="fr-FR" sz="2900" b="1"/>
+              <a:t>à court terme</a:t>
+            </a:r>
+            <a:r>
+              <a:rPr lang="fr-FR" sz="2900"/>
+              <a:t> : relèvent souvent de l'éfficacit.</a:t>
+            </a:r>
+          </a:p>
+          <a:p>
+            <a:pPr marL="742950" lvl="1" indent="-285750">
+              <a:buFont typeface="Arial" panose="020B0604020202020204" pitchFamily="34" charset="0"/>
+              <a:buChar char="•"/>
+            </a:pPr>
+            <a:r>
+              <a:rPr lang="fr-FR" sz="2900"/>
+              <a:t>Adopte une rigueur méthodologique pour isoler l'effet de l'intervention des autres facteurs.</a:t>
+            </a:r>
+          </a:p>
+          <a:p>
+            <a:pPr marL="742950" lvl="1" indent="-285750">
+              <a:buFont typeface="Arial" panose="020B0604020202020204" pitchFamily="34" charset="0"/>
+              <a:buChar char="•"/>
+            </a:pPr>
+            <a:r>
+              <a:rPr lang="fr-FR" sz="2900"/>
+              <a:t>Priorise la </a:t>
+            </a:r>
+            <a:r>
+              <a:rPr lang="fr-FR" sz="2900" b="1"/>
+              <a:t>causalité</a:t>
+            </a:r>
+            <a:r>
+              <a:rPr lang="fr-FR" sz="2900"/>
+              <a:t>, cherchant à déterminer les effets directs et mesurables d'une action.</a:t>
+            </a:r>
+          </a:p>
+          <a:p>
+            <a:endParaRPr lang="fr-FR"/>
           </a:p>
         </p:txBody>
       </p:sp>
     </p:spTree>
     <p:extLst>
       <p:ext uri="{BB962C8B-B14F-4D97-AF65-F5344CB8AC3E}">
-        <p14:creationId xmlns:p14="http://schemas.microsoft.com/office/powerpoint/2010/main" val="3929253494"/>
+        <p14:creationId xmlns:p14="http://schemas.microsoft.com/office/powerpoint/2010/main" val="1150898721"/>
       </p:ext>
     </p:extLst>
   </p:cSld>
@@ -10390,6 +10393,120 @@
       </p:grpSpPr>
       <p:sp>
         <p:nvSpPr>
+          <p:cNvPr id="7" name="Titre 6">
+            <a:extLst>
+              <a:ext uri="{FF2B5EF4-FFF2-40B4-BE49-F238E27FC236}">
+                <a16:creationId xmlns:a16="http://schemas.microsoft.com/office/drawing/2014/main" id="{E400F466-A91D-D2CA-B1E2-E0C18A1B3FDF}"/>
+              </a:ext>
+            </a:extLst>
+          </p:cNvPr>
+          <p:cNvSpPr>
+            <a:spLocks noGrp="1"/>
+          </p:cNvSpPr>
+          <p:nvPr>
+            <p:ph type="title"/>
+            <p:custDataLst>
+              <p:tags r:id="rId1"/>
+            </p:custDataLst>
+          </p:nvPr>
+        </p:nvSpPr>
+        <p:spPr>
+          <a:xfrm>
+            <a:off x="831850" y="1709739"/>
+            <a:ext cx="10515600" cy="2232342"/>
+          </a:xfrm>
+        </p:spPr>
+        <p:txBody>
+          <a:bodyPr>
+            <a:normAutofit/>
+          </a:bodyPr>
+          <a:lstStyle/>
+          <a:p>
+            <a:pPr algn="ctr"/>
+            <a:r>
+              <a:rPr lang="fr-FR" sz="4800"/>
+              <a:t>Discussion</a:t>
+            </a:r>
+          </a:p>
+        </p:txBody>
+      </p:sp>
+      <p:sp>
+        <p:nvSpPr>
+          <p:cNvPr id="8" name="Espace réservé du texte 7">
+            <a:extLst>
+              <a:ext uri="{FF2B5EF4-FFF2-40B4-BE49-F238E27FC236}">
+                <a16:creationId xmlns:a16="http://schemas.microsoft.com/office/drawing/2014/main" id="{8BA47168-526C-482B-4A6D-E14A0C0A3BF9}"/>
+              </a:ext>
+            </a:extLst>
+          </p:cNvPr>
+          <p:cNvSpPr>
+            <a:spLocks noGrp="1"/>
+          </p:cNvSpPr>
+          <p:nvPr>
+            <p:ph type="body" idx="1"/>
+            <p:custDataLst>
+              <p:tags r:id="rId2"/>
+            </p:custDataLst>
+          </p:nvPr>
+        </p:nvSpPr>
+        <p:spPr>
+          <a:xfrm>
+            <a:off x="831850" y="4589463"/>
+            <a:ext cx="10515600" cy="1500187"/>
+          </a:xfrm>
+        </p:spPr>
+        <p:txBody>
+          <a:bodyPr>
+            <a:normAutofit/>
+          </a:bodyPr>
+          <a:lstStyle/>
+          <a:p>
+            <a:r>
+              <a:rPr lang="fr-FR" sz="3200" i="1"/>
+              <a:t>Que pensez-vous de ces définitions de l’impact ? </a:t>
+            </a:r>
+          </a:p>
+          <a:p>
+            <a:r>
+              <a:rPr lang="fr-FR" sz="3200" i="1"/>
+              <a:t>Qu’est-ce qui manque selon vous ?</a:t>
+            </a:r>
+            <a:endParaRPr lang="fr-FR" sz="3200"/>
+          </a:p>
+        </p:txBody>
+      </p:sp>
+    </p:spTree>
+    <p:extLst>
+      <p:ext uri="{BB962C8B-B14F-4D97-AF65-F5344CB8AC3E}">
+        <p14:creationId xmlns:p14="http://schemas.microsoft.com/office/powerpoint/2010/main" val="3929253494"/>
+      </p:ext>
+    </p:extLst>
+  </p:cSld>
+  <p:clrMapOvr>
+    <a:masterClrMapping/>
+  </p:clrMapOvr>
+</p:sld>
+</file>
+
+<file path=ppt/slides/slide17.xml><?xml version="1.0" encoding="utf-8"?>
+<p:sld xmlns:a="http://schemas.openxmlformats.org/drawingml/2006/main" xmlns:r="http://schemas.openxmlformats.org/officeDocument/2006/relationships" xmlns:p="http://schemas.openxmlformats.org/presentationml/2006/main">
+  <p:cSld>
+    <p:spTree>
+      <p:nvGrpSpPr>
+        <p:cNvPr id="1" name=""/>
+        <p:cNvGrpSpPr/>
+        <p:nvPr/>
+      </p:nvGrpSpPr>
+      <p:grpSpPr>
+        <a:xfrm>
+          <a:off x="0" y="0"/>
+          <a:ext cx="0" cy="0"/>
+          <a:chOff x="0" y="0"/>
+          <a:chExt cx="0" cy="0"/>
+        </a:xfrm>
+      </p:grpSpPr>
+      <p:sp>
+        <p:nvSpPr>
           <p:cNvPr id="2" name="Titre 1">
             <a:extLst>
               <a:ext uri="{FF2B5EF4-FFF2-40B4-BE49-F238E27FC236}">
@@ -10463,7 +10580,7 @@
 </p:sld>
 </file>
 
-<file path=ppt/slides/slide17.xml><?xml version="1.0" encoding="utf-8"?>
+<file path=ppt/slides/slide18.xml><?xml version="1.0" encoding="utf-8"?>
 <p:sld xmlns:a="http://schemas.openxmlformats.org/drawingml/2006/main" xmlns:r="http://schemas.openxmlformats.org/officeDocument/2006/relationships" xmlns:p="http://schemas.openxmlformats.org/presentationml/2006/main">
   <p:cSld>
     <p:spTree>
@@ -11294,125 +11411,6 @@
 </p:sld>
 </file>
 
-<file path=ppt/slides/slide18.xml><?xml version="1.0" encoding="utf-8"?>
-<p:sld xmlns:a="http://schemas.openxmlformats.org/drawingml/2006/main" xmlns:r="http://schemas.openxmlformats.org/officeDocument/2006/relationships" xmlns:p="http://schemas.openxmlformats.org/presentationml/2006/main">
-  <p:cSld>
-    <p:spTree>
-      <p:nvGrpSpPr>
-        <p:cNvPr id="1" name=""/>
-        <p:cNvGrpSpPr/>
-        <p:nvPr/>
-      </p:nvGrpSpPr>
-      <p:grpSpPr>
-        <a:xfrm>
-          <a:off x="0" y="0"/>
-          <a:ext cx="0" cy="0"/>
-          <a:chOff x="0" y="0"/>
-          <a:chExt cx="0" cy="0"/>
-        </a:xfrm>
-      </p:grpSpPr>
-      <p:sp>
-        <p:nvSpPr>
-          <p:cNvPr id="2" name="Titre 1">
-            <a:extLst>
-              <a:ext uri="{FF2B5EF4-FFF2-40B4-BE49-F238E27FC236}">
-                <a16:creationId xmlns:a16="http://schemas.microsoft.com/office/drawing/2014/main" id="{C8837810-A2B9-026C-C20D-BDC7A11F0055}"/>
-              </a:ext>
-            </a:extLst>
-          </p:cNvPr>
-          <p:cNvSpPr>
-            <a:spLocks noGrp="1"/>
-          </p:cNvSpPr>
-          <p:nvPr>
-            <p:ph type="title"/>
-            <p:custDataLst>
-              <p:tags r:id="rId1"/>
-            </p:custDataLst>
-          </p:nvPr>
-        </p:nvSpPr>
-        <p:spPr/>
-        <p:txBody>
-          <a:bodyPr/>
-          <a:lstStyle/>
-          <a:p>
-            <a:r>
-              <a:rPr lang="fr-FR"/>
-              <a:t>Le problème d’identification (exemple 2)</a:t>
-            </a:r>
-          </a:p>
-        </p:txBody>
-      </p:sp>
-      <p:sp>
-        <p:nvSpPr>
-          <p:cNvPr id="3" name="Espace réservé du contenu 2">
-            <a:extLst>
-              <a:ext uri="{FF2B5EF4-FFF2-40B4-BE49-F238E27FC236}">
-                <a16:creationId xmlns:a16="http://schemas.microsoft.com/office/drawing/2014/main" id="{A7056653-CC0A-D5EF-15E5-3BA6A3BD7C2D}"/>
-              </a:ext>
-            </a:extLst>
-          </p:cNvPr>
-          <p:cNvSpPr>
-            <a:spLocks noGrp="1"/>
-          </p:cNvSpPr>
-          <p:nvPr>
-            <p:ph idx="1"/>
-            <p:custDataLst>
-              <p:tags r:id="rId2"/>
-            </p:custDataLst>
-          </p:nvPr>
-        </p:nvSpPr>
-        <p:spPr/>
-        <p:txBody>
-          <a:bodyPr/>
-          <a:lstStyle/>
-          <a:p>
-            <a:r>
-              <a:rPr lang="fr-FR"/>
-              <a:t>A New York et à Chicago, on observe une étroite correspondance entre : </a:t>
-            </a:r>
-          </a:p>
-          <a:p>
-            <a:pPr lvl="1"/>
-            <a:r>
-              <a:rPr lang="fr-FR"/>
-              <a:t>Le niveau de ventes de glaces (crèmes glacées)</a:t>
-            </a:r>
-          </a:p>
-          <a:p>
-            <a:pPr lvl="1"/>
-            <a:r>
-              <a:rPr lang="fr-FR"/>
-              <a:t>Le nombre de meurtres</a:t>
-            </a:r>
-          </a:p>
-          <a:p>
-            <a:pPr lvl="1"/>
-            <a:endParaRPr lang="fr-FR"/>
-          </a:p>
-          <a:p>
-            <a:pPr marL="0" indent="0" algn="ctr">
-              <a:buNone/>
-            </a:pPr>
-            <a:r>
-              <a:rPr lang="fr-FR"/>
-              <a:t>Y a-t-il un impact de la consommation de glaces sur les meurtres ?</a:t>
-            </a:r>
-          </a:p>
-        </p:txBody>
-      </p:sp>
-    </p:spTree>
-    <p:extLst>
-      <p:ext uri="{BB962C8B-B14F-4D97-AF65-F5344CB8AC3E}">
-        <p14:creationId xmlns:p14="http://schemas.microsoft.com/office/powerpoint/2010/main" val="2334934987"/>
-      </p:ext>
-    </p:extLst>
-  </p:cSld>
-  <p:clrMapOvr>
-    <a:masterClrMapping/>
-  </p:clrMapOvr>
-</p:sld>
-</file>
-
 <file path=ppt/slides/slide19.xml><?xml version="1.0" encoding="utf-8"?>
 <p:sld xmlns:a="http://schemas.openxmlformats.org/drawingml/2006/main" xmlns:r="http://schemas.openxmlformats.org/officeDocument/2006/relationships" xmlns:p="http://schemas.openxmlformats.org/presentationml/2006/main">
   <p:cSld>
@@ -11430,46 +11428,43 @@
           <a:chExt cx="0" cy="0"/>
         </a:xfrm>
       </p:grpSpPr>
-      <p:pic>
-        <p:nvPicPr>
-          <p:cNvPr id="15" name="Image 14">
-            <a:extLst>
-              <a:ext uri="{FF2B5EF4-FFF2-40B4-BE49-F238E27FC236}">
-                <a16:creationId xmlns:a16="http://schemas.microsoft.com/office/drawing/2014/main" id="{1983A8AC-F069-399B-F2F6-9D00DC0CD578}"/>
-              </a:ext>
-            </a:extLst>
-          </p:cNvPr>
-          <p:cNvPicPr>
-            <a:picLocks noChangeAspect="1"/>
-          </p:cNvPicPr>
-          <p:nvPr>
+      <p:sp>
+        <p:nvSpPr>
+          <p:cNvPr id="2" name="Titre 1">
+            <a:extLst>
+              <a:ext uri="{FF2B5EF4-FFF2-40B4-BE49-F238E27FC236}">
+                <a16:creationId xmlns:a16="http://schemas.microsoft.com/office/drawing/2014/main" id="{C8837810-A2B9-026C-C20D-BDC7A11F0055}"/>
+              </a:ext>
+            </a:extLst>
+          </p:cNvPr>
+          <p:cNvSpPr>
+            <a:spLocks noGrp="1"/>
+          </p:cNvSpPr>
+          <p:nvPr>
+            <p:ph type="title"/>
             <p:custDataLst>
               <p:tags r:id="rId1"/>
             </p:custDataLst>
           </p:nvPr>
-        </p:nvPicPr>
-        <p:blipFill>
-          <a:blip r:embed="rId5"/>
-          <a:stretch>
-            <a:fillRect/>
-          </a:stretch>
-        </p:blipFill>
-        <p:spPr>
-          <a:xfrm>
-            <a:off x="1287397" y="1404433"/>
-            <a:ext cx="8824725" cy="4313294"/>
-          </a:xfrm>
-          <a:prstGeom prst="rect">
-            <a:avLst/>
-          </a:prstGeom>
-        </p:spPr>
-      </p:pic>
-      <p:sp>
-        <p:nvSpPr>
-          <p:cNvPr id="2" name="Titre 1">
-            <a:extLst>
-              <a:ext uri="{FF2B5EF4-FFF2-40B4-BE49-F238E27FC236}">
-                <a16:creationId xmlns:a16="http://schemas.microsoft.com/office/drawing/2014/main" id="{D7524D6E-3471-8218-0DBE-B0689BF71B2B}"/>
+        </p:nvSpPr>
+        <p:spPr/>
+        <p:txBody>
+          <a:bodyPr/>
+          <a:lstStyle/>
+          <a:p>
+            <a:r>
+              <a:rPr lang="fr-FR"/>
+              <a:t>Le problème d’identification (exemple 2)</a:t>
+            </a:r>
+          </a:p>
+        </p:txBody>
+      </p:sp>
+      <p:sp>
+        <p:nvSpPr>
+          <p:cNvPr id="3" name="Espace réservé du contenu 2">
+            <a:extLst>
+              <a:ext uri="{FF2B5EF4-FFF2-40B4-BE49-F238E27FC236}">
+                <a16:creationId xmlns:a16="http://schemas.microsoft.com/office/drawing/2014/main" id="{A7056653-CC0A-D5EF-15E5-3BA6A3BD7C2D}"/>
               </a:ext>
             </a:extLst>
           </p:cNvPr>
@@ -11477,7 +11472,7 @@
             <a:spLocks noGrp="1"/>
           </p:cNvSpPr>
           <p:nvPr>
-            <p:ph type="title"/>
+            <p:ph idx="1"/>
             <p:custDataLst>
               <p:tags r:id="rId2"/>
             </p:custDataLst>
@@ -11490,79 +11485,34 @@
           <a:p>
             <a:r>
               <a:rPr lang="fr-FR"/>
-              <a:t>Le problème d’identification (exemple 3)</a:t>
-            </a:r>
-          </a:p>
-        </p:txBody>
-      </p:sp>
-      <p:sp>
-        <p:nvSpPr>
-          <p:cNvPr id="13" name="Espace réservé du contenu 12">
-            <a:extLst>
-              <a:ext uri="{FF2B5EF4-FFF2-40B4-BE49-F238E27FC236}">
-                <a16:creationId xmlns:a16="http://schemas.microsoft.com/office/drawing/2014/main" id="{249094C9-245B-9BA5-29AD-78633594AC9D}"/>
-              </a:ext>
-            </a:extLst>
-          </p:cNvPr>
-          <p:cNvSpPr>
-            <a:spLocks noGrp="1"/>
-          </p:cNvSpPr>
-          <p:nvPr>
-            <p:ph idx="1"/>
-            <p:custDataLst>
-              <p:tags r:id="rId3"/>
-            </p:custDataLst>
-          </p:nvPr>
-        </p:nvSpPr>
-        <p:spPr/>
-        <p:txBody>
-          <a:bodyPr>
-            <a:normAutofit fontScale="77500" lnSpcReduction="20000"/>
-          </a:bodyPr>
-          <a:lstStyle/>
-          <a:p>
+              <a:t>A New York et à Chicago, on observe une étroite correspondance entre : </a:t>
+            </a:r>
+          </a:p>
+          <a:p>
+            <a:pPr lvl="1"/>
+            <a:r>
+              <a:rPr lang="fr-FR"/>
+              <a:t>Le niveau de ventes de glaces (crèmes glacées)</a:t>
+            </a:r>
+          </a:p>
+          <a:p>
+            <a:pPr lvl="1"/>
+            <a:r>
+              <a:rPr lang="fr-FR"/>
+              <a:t>Le nombre de meurtres</a:t>
+            </a:r>
+          </a:p>
+          <a:p>
+            <a:pPr lvl="1"/>
             <a:endParaRPr lang="fr-FR"/>
           </a:p>
           <a:p>
-            <a:endParaRPr lang="fr-FR"/>
-          </a:p>
-          <a:p>
-            <a:endParaRPr lang="fr-FR"/>
-          </a:p>
-          <a:p>
-            <a:endParaRPr lang="fr-FR"/>
-          </a:p>
-          <a:p>
-            <a:endParaRPr lang="fr-FR"/>
-          </a:p>
-          <a:p>
-            <a:endParaRPr lang="fr-FR"/>
-          </a:p>
-          <a:p>
-            <a:endParaRPr lang="fr-FR"/>
-          </a:p>
-          <a:p>
-            <a:endParaRPr lang="fr-FR"/>
-          </a:p>
-          <a:p>
-            <a:endParaRPr lang="fr-FR"/>
-          </a:p>
-          <a:p>
-            <a:endParaRPr lang="fr-FR"/>
-          </a:p>
-          <a:p>
-            <a:pPr marL="0" indent="0">
+            <a:pPr marL="0" indent="0" algn="ctr">
               <a:buNone/>
             </a:pPr>
-            <a:endParaRPr lang="fr-FR"/>
-          </a:p>
-          <a:p>
-            <a:pPr marL="0" indent="0">
-              <a:buNone/>
-            </a:pPr>
             <a:r>
               <a:rPr lang="fr-FR"/>
-              <a:t>Source: https://tylervigen.com/spurious-correlations</a:t>
+              <a:t>Y a-t-il un impact de la consommation de glaces sur les meurtres ?</a:t>
             </a:r>
           </a:p>
         </p:txBody>
@@ -11570,7 +11520,7 @@
     </p:spTree>
     <p:extLst>
       <p:ext uri="{BB962C8B-B14F-4D97-AF65-F5344CB8AC3E}">
-        <p14:creationId xmlns:p14="http://schemas.microsoft.com/office/powerpoint/2010/main" val="2104579397"/>
+        <p14:creationId xmlns:p14="http://schemas.microsoft.com/office/powerpoint/2010/main" val="2334934987"/>
       </p:ext>
     </p:extLst>
   </p:cSld>
@@ -11703,6 +11653,173 @@
           <a:chExt cx="0" cy="0"/>
         </a:xfrm>
       </p:grpSpPr>
+      <p:pic>
+        <p:nvPicPr>
+          <p:cNvPr id="15" name="Image 14">
+            <a:extLst>
+              <a:ext uri="{FF2B5EF4-FFF2-40B4-BE49-F238E27FC236}">
+                <a16:creationId xmlns:a16="http://schemas.microsoft.com/office/drawing/2014/main" id="{1983A8AC-F069-399B-F2F6-9D00DC0CD578}"/>
+              </a:ext>
+            </a:extLst>
+          </p:cNvPr>
+          <p:cNvPicPr>
+            <a:picLocks noChangeAspect="1"/>
+          </p:cNvPicPr>
+          <p:nvPr>
+            <p:custDataLst>
+              <p:tags r:id="rId1"/>
+            </p:custDataLst>
+          </p:nvPr>
+        </p:nvPicPr>
+        <p:blipFill>
+          <a:blip r:embed="rId5"/>
+          <a:stretch>
+            <a:fillRect/>
+          </a:stretch>
+        </p:blipFill>
+        <p:spPr>
+          <a:xfrm>
+            <a:off x="1287397" y="1404433"/>
+            <a:ext cx="8824725" cy="4313294"/>
+          </a:xfrm>
+          <a:prstGeom prst="rect">
+            <a:avLst/>
+          </a:prstGeom>
+        </p:spPr>
+      </p:pic>
+      <p:sp>
+        <p:nvSpPr>
+          <p:cNvPr id="2" name="Titre 1">
+            <a:extLst>
+              <a:ext uri="{FF2B5EF4-FFF2-40B4-BE49-F238E27FC236}">
+                <a16:creationId xmlns:a16="http://schemas.microsoft.com/office/drawing/2014/main" id="{D7524D6E-3471-8218-0DBE-B0689BF71B2B}"/>
+              </a:ext>
+            </a:extLst>
+          </p:cNvPr>
+          <p:cNvSpPr>
+            <a:spLocks noGrp="1"/>
+          </p:cNvSpPr>
+          <p:nvPr>
+            <p:ph type="title"/>
+            <p:custDataLst>
+              <p:tags r:id="rId2"/>
+            </p:custDataLst>
+          </p:nvPr>
+        </p:nvSpPr>
+        <p:spPr/>
+        <p:txBody>
+          <a:bodyPr/>
+          <a:lstStyle/>
+          <a:p>
+            <a:r>
+              <a:rPr lang="fr-FR"/>
+              <a:t>Le problème d’identification (exemple 3)</a:t>
+            </a:r>
+          </a:p>
+        </p:txBody>
+      </p:sp>
+      <p:sp>
+        <p:nvSpPr>
+          <p:cNvPr id="13" name="Espace réservé du contenu 12">
+            <a:extLst>
+              <a:ext uri="{FF2B5EF4-FFF2-40B4-BE49-F238E27FC236}">
+                <a16:creationId xmlns:a16="http://schemas.microsoft.com/office/drawing/2014/main" id="{249094C9-245B-9BA5-29AD-78633594AC9D}"/>
+              </a:ext>
+            </a:extLst>
+          </p:cNvPr>
+          <p:cNvSpPr>
+            <a:spLocks noGrp="1"/>
+          </p:cNvSpPr>
+          <p:nvPr>
+            <p:ph idx="1"/>
+            <p:custDataLst>
+              <p:tags r:id="rId3"/>
+            </p:custDataLst>
+          </p:nvPr>
+        </p:nvSpPr>
+        <p:spPr/>
+        <p:txBody>
+          <a:bodyPr>
+            <a:normAutofit fontScale="77500" lnSpcReduction="20000"/>
+          </a:bodyPr>
+          <a:lstStyle/>
+          <a:p>
+            <a:endParaRPr lang="fr-FR"/>
+          </a:p>
+          <a:p>
+            <a:endParaRPr lang="fr-FR"/>
+          </a:p>
+          <a:p>
+            <a:endParaRPr lang="fr-FR"/>
+          </a:p>
+          <a:p>
+            <a:endParaRPr lang="fr-FR"/>
+          </a:p>
+          <a:p>
+            <a:endParaRPr lang="fr-FR"/>
+          </a:p>
+          <a:p>
+            <a:endParaRPr lang="fr-FR"/>
+          </a:p>
+          <a:p>
+            <a:endParaRPr lang="fr-FR"/>
+          </a:p>
+          <a:p>
+            <a:endParaRPr lang="fr-FR"/>
+          </a:p>
+          <a:p>
+            <a:endParaRPr lang="fr-FR"/>
+          </a:p>
+          <a:p>
+            <a:endParaRPr lang="fr-FR"/>
+          </a:p>
+          <a:p>
+            <a:pPr marL="0" indent="0">
+              <a:buNone/>
+            </a:pPr>
+            <a:endParaRPr lang="fr-FR"/>
+          </a:p>
+          <a:p>
+            <a:pPr marL="0" indent="0">
+              <a:buNone/>
+            </a:pPr>
+            <a:r>
+              <a:rPr lang="fr-FR"/>
+              <a:t>Source: https://tylervigen.com/spurious-correlations</a:t>
+            </a:r>
+          </a:p>
+        </p:txBody>
+      </p:sp>
+    </p:spTree>
+    <p:extLst>
+      <p:ext uri="{BB962C8B-B14F-4D97-AF65-F5344CB8AC3E}">
+        <p14:creationId xmlns:p14="http://schemas.microsoft.com/office/powerpoint/2010/main" val="2104579397"/>
+      </p:ext>
+    </p:extLst>
+  </p:cSld>
+  <p:clrMapOvr>
+    <a:masterClrMapping/>
+  </p:clrMapOvr>
+</p:sld>
+</file>
+
+<file path=ppt/slides/slide21.xml><?xml version="1.0" encoding="utf-8"?>
+<p:sld xmlns:a="http://schemas.openxmlformats.org/drawingml/2006/main" xmlns:r="http://schemas.openxmlformats.org/officeDocument/2006/relationships" xmlns:p="http://schemas.openxmlformats.org/presentationml/2006/main">
+  <p:cSld>
+    <p:spTree>
+      <p:nvGrpSpPr>
+        <p:cNvPr id="1" name=""/>
+        <p:cNvGrpSpPr/>
+        <p:nvPr/>
+      </p:nvGrpSpPr>
+      <p:grpSpPr>
+        <a:xfrm>
+          <a:off x="0" y="0"/>
+          <a:ext cx="0" cy="0"/>
+          <a:chOff x="0" y="0"/>
+          <a:chExt cx="0" cy="0"/>
+        </a:xfrm>
+      </p:grpSpPr>
       <p:sp>
         <p:nvSpPr>
           <p:cNvPr id="2" name="Titre 1">
@@ -11841,7 +11958,7 @@
 </p:sld>
 </file>
 
-<file path=ppt/slides/slide21.xml><?xml version="1.0" encoding="utf-8"?>
+<file path=ppt/slides/slide22.xml><?xml version="1.0" encoding="utf-8"?>
 <p:sld xmlns:a="http://schemas.openxmlformats.org/drawingml/2006/main" xmlns:r="http://schemas.openxmlformats.org/officeDocument/2006/relationships" xmlns:p="http://schemas.openxmlformats.org/presentationml/2006/main">
   <p:cSld>
     <p:spTree>
@@ -11941,7 +12058,7 @@
 </p:sld>
 </file>
 
-<file path=ppt/slides/slide22.xml><?xml version="1.0" encoding="utf-8"?>
+<file path=ppt/slides/slide23.xml><?xml version="1.0" encoding="utf-8"?>
 <p:sld xmlns:a="http://schemas.openxmlformats.org/drawingml/2006/main" xmlns:r="http://schemas.openxmlformats.org/officeDocument/2006/relationships" xmlns:p="http://schemas.openxmlformats.org/presentationml/2006/main">
   <p:cSld>
     <p:spTree>
@@ -12578,7 +12695,7 @@
 </p:sld>
 </file>
 
-<file path=ppt/slides/slide23.xml><?xml version="1.0" encoding="utf-8"?>
+<file path=ppt/slides/slide24.xml><?xml version="1.0" encoding="utf-8"?>
 <p:sld xmlns:a="http://schemas.openxmlformats.org/drawingml/2006/main" xmlns:r="http://schemas.openxmlformats.org/officeDocument/2006/relationships" xmlns:p="http://schemas.openxmlformats.org/presentationml/2006/main">
   <p:cSld>
     <p:spTree>
@@ -12866,7 +12983,7 @@
 </p:sld>
 </file>
 
-<file path=ppt/slides/slide24.xml><?xml version="1.0" encoding="utf-8"?>
+<file path=ppt/slides/slide25.xml><?xml version="1.0" encoding="utf-8"?>
 <p:sld xmlns:a="http://schemas.openxmlformats.org/drawingml/2006/main" xmlns:r="http://schemas.openxmlformats.org/officeDocument/2006/relationships" xmlns:p="http://schemas.openxmlformats.org/presentationml/2006/main">
   <p:cSld>
     <p:spTree>
@@ -13274,7 +13391,7 @@
 </p:sld>
 </file>
 
-<file path=ppt/slides/slide25.xml><?xml version="1.0" encoding="utf-8"?>
+<file path=ppt/slides/slide26.xml><?xml version="1.0" encoding="utf-8"?>
 <p:sld xmlns:a="http://schemas.openxmlformats.org/drawingml/2006/main" xmlns:r="http://schemas.openxmlformats.org/officeDocument/2006/relationships" xmlns:p="http://schemas.openxmlformats.org/presentationml/2006/main">
   <p:cSld>
     <p:spTree>
@@ -13444,7 +13561,7 @@
 </p:sld>
 </file>
 
-<file path=ppt/slides/slide26.xml><?xml version="1.0" encoding="utf-8"?>
+<file path=ppt/slides/slide27.xml><?xml version="1.0" encoding="utf-8"?>
 <p:sld xmlns:a="http://schemas.openxmlformats.org/drawingml/2006/main" xmlns:r="http://schemas.openxmlformats.org/officeDocument/2006/relationships" xmlns:p="http://schemas.openxmlformats.org/presentationml/2006/main">
   <p:cSld>
     <p:spTree>
@@ -14598,10 +14715,10 @@
       </p:grpSpPr>
       <p:sp>
         <p:nvSpPr>
-          <p:cNvPr id="4" name="Titre 3">
-            <a:extLst>
-              <a:ext uri="{FF2B5EF4-FFF2-40B4-BE49-F238E27FC236}">
-                <a16:creationId xmlns:a16="http://schemas.microsoft.com/office/drawing/2014/main" id="{783B5AB8-00B2-00C1-44A7-96E2271C8CB1}"/>
+          <p:cNvPr id="2" name="Titre 1">
+            <a:extLst>
+              <a:ext uri="{FF2B5EF4-FFF2-40B4-BE49-F238E27FC236}">
+                <a16:creationId xmlns:a16="http://schemas.microsoft.com/office/drawing/2014/main" id="{8B2AAC02-ABBE-446A-35B7-F46D2AC485F8}"/>
               </a:ext>
             </a:extLst>
           </p:cNvPr>
@@ -14610,9 +14727,6 @@
           </p:cNvSpPr>
           <p:nvPr>
             <p:ph type="title"/>
-            <p:custDataLst>
-              <p:tags r:id="rId1"/>
-            </p:custDataLst>
           </p:nvPr>
         </p:nvSpPr>
         <p:spPr/>
@@ -14622,17 +14736,17 @@
           <a:p>
             <a:r>
               <a:rPr lang="fr-FR"/>
-              <a:t>Jour 1 : Fondements théoriques</a:t>
-            </a:r>
-          </a:p>
-        </p:txBody>
-      </p:sp>
-      <p:sp>
-        <p:nvSpPr>
-          <p:cNvPr id="3" name="Espace réservé du texte 2">
-            <a:extLst>
-              <a:ext uri="{FF2B5EF4-FFF2-40B4-BE49-F238E27FC236}">
-                <a16:creationId xmlns:a16="http://schemas.microsoft.com/office/drawing/2014/main" id="{BBB481A2-F525-8D0B-048B-EE53607194F1}"/>
+              <a:t>Modalités technique</a:t>
+            </a:r>
+          </a:p>
+        </p:txBody>
+      </p:sp>
+      <p:sp>
+        <p:nvSpPr>
+          <p:cNvPr id="3" name="Espace réservé du contenu 2">
+            <a:extLst>
+              <a:ext uri="{FF2B5EF4-FFF2-40B4-BE49-F238E27FC236}">
+                <a16:creationId xmlns:a16="http://schemas.microsoft.com/office/drawing/2014/main" id="{68925107-2EC4-6D50-E12D-70262671ED46}"/>
               </a:ext>
             </a:extLst>
           </p:cNvPr>
@@ -14640,25 +14754,157 @@
             <a:spLocks noGrp="1"/>
           </p:cNvSpPr>
           <p:nvPr>
-            <p:ph type="body" idx="1"/>
-            <p:custDataLst>
-              <p:tags r:id="rId2"/>
-            </p:custDataLst>
+            <p:ph idx="1"/>
           </p:nvPr>
         </p:nvSpPr>
         <p:spPr/>
         <p:txBody>
-          <a:bodyPr/>
+          <a:bodyPr>
+            <a:normAutofit fontScale="92500" lnSpcReduction="10000"/>
+          </a:bodyPr>
           <a:lstStyle/>
           <a:p>
-            <a:endParaRPr lang="fr-FR"/>
-          </a:p>
-        </p:txBody>
-      </p:sp>
+            <a:r>
+              <a:rPr lang="fr-FR"/>
+              <a:t>Utilisation d'environnements "cloud":</a:t>
+            </a:r>
+          </a:p>
+          <a:p>
+            <a:pPr lvl="1"/>
+            <a:r>
+              <a:rPr lang="fr-FR"/>
+              <a:t>SSP Cloud</a:t>
+            </a:r>
+          </a:p>
+          <a:p>
+            <a:pPr lvl="1"/>
+            <a:r>
+              <a:rPr lang="fr-FR"/>
+              <a:t>Liens et mot de passe disponible chaque jour</a:t>
+            </a:r>
+          </a:p>
+          <a:p>
+            <a:r>
+              <a:rPr lang="fr-FR"/>
+              <a:t>Supports disponibles en ligne</a:t>
+            </a:r>
+          </a:p>
+          <a:p>
+            <a:pPr lvl="1"/>
+            <a:r>
+              <a:rPr lang="fr-FR"/>
+              <a:t>Version technique : </a:t>
+            </a:r>
+          </a:p>
+          <a:p>
+            <a:pPr marL="0" indent="0">
+              <a:buNone/>
+            </a:pPr>
+            <a:r>
+              <a:rPr lang="fr-FR" sz="2400">
+                <a:hlinkClick r:id="rId2"/>
+              </a:rPr>
+              <a:t>https://github.com/BETSAKA/statcap_impact_training</a:t>
+            </a:r>
+            <a:r>
+              <a:rPr lang="fr-FR" sz="2400"/>
+              <a:t> </a:t>
+            </a:r>
+          </a:p>
+          <a:p>
+            <a:pPr lvl="1"/>
+            <a:r>
+              <a:rPr lang="fr-FR"/>
+              <a:t>Rendu visuel :</a:t>
+            </a:r>
+          </a:p>
+          <a:p>
+            <a:pPr marL="0" indent="0">
+              <a:buNone/>
+            </a:pPr>
+            <a:r>
+              <a:rPr lang="fr-FR" sz="2400">
+                <a:hlinkClick r:id="rId3"/>
+              </a:rPr>
+              <a:t>https://betsaka.github.io/statcap_impact_training</a:t>
+            </a:r>
+            <a:r>
+              <a:rPr lang="fr-FR" sz="2400"/>
+              <a:t> </a:t>
+            </a:r>
+          </a:p>
+          <a:p>
+            <a:pPr marL="0" indent="0" algn="ctr">
+              <a:buNone/>
+            </a:pPr>
+            <a:endParaRPr lang="fr-FR">
+              <a:solidFill>
+                <a:srgbClr val="FF0000"/>
+              </a:solidFill>
+            </a:endParaRPr>
+          </a:p>
+          <a:p>
+            <a:pPr marL="0" indent="0" algn="ctr">
+              <a:buNone/>
+            </a:pPr>
+            <a:r>
+              <a:rPr lang="fr-FR">
+                <a:solidFill>
+                  <a:srgbClr val="FF0000"/>
+                </a:solidFill>
+              </a:rPr>
+              <a:t>Attention à bien réserver l'usage des connexions wifi aux besoins du cours SVP</a:t>
+            </a:r>
+            <a:r>
+              <a:rPr lang="fr-FR" sz="2400"/>
+              <a:t> </a:t>
+            </a:r>
+          </a:p>
+        </p:txBody>
+      </p:sp>
+      <p:pic>
+        <p:nvPicPr>
+          <p:cNvPr id="5" name="Graphique 4">
+            <a:extLst>
+              <a:ext uri="{FF2B5EF4-FFF2-40B4-BE49-F238E27FC236}">
+                <a16:creationId xmlns:a16="http://schemas.microsoft.com/office/drawing/2014/main" id="{6CA8D600-84E8-A205-073C-22879B1BEBF5}"/>
+              </a:ext>
+            </a:extLst>
+          </p:cNvPr>
+          <p:cNvPicPr>
+            <a:picLocks noChangeAspect="1"/>
+          </p:cNvPicPr>
+          <p:nvPr/>
+        </p:nvPicPr>
+        <p:blipFill>
+          <a:blip r:embed="rId4">
+            <a:extLst>
+              <a:ext uri="{28A0092B-C50C-407E-A947-70E740481C1C}">
+                <a14:useLocalDpi xmlns:a14="http://schemas.microsoft.com/office/drawing/2010/main" val="0"/>
+              </a:ext>
+              <a:ext uri="{96DAC541-7B7A-43D3-8B79-37D633B846F1}">
+                <asvg:svgBlip xmlns:asvg="http://schemas.microsoft.com/office/drawing/2016/SVG/main" r:embed="rId5"/>
+              </a:ext>
+            </a:extLst>
+          </a:blip>
+          <a:stretch>
+            <a:fillRect/>
+          </a:stretch>
+        </p:blipFill>
+        <p:spPr>
+          <a:xfrm>
+            <a:off x="7841374" y="1364876"/>
+            <a:ext cx="3856640" cy="3856640"/>
+          </a:xfrm>
+          <a:prstGeom prst="rect">
+            <a:avLst/>
+          </a:prstGeom>
+        </p:spPr>
+      </p:pic>
     </p:spTree>
     <p:extLst>
       <p:ext uri="{BB962C8B-B14F-4D97-AF65-F5344CB8AC3E}">
-        <p14:creationId xmlns:p14="http://schemas.microsoft.com/office/powerpoint/2010/main" val="3329902575"/>
+        <p14:creationId xmlns:p14="http://schemas.microsoft.com/office/powerpoint/2010/main" val="2964033601"/>
       </p:ext>
     </p:extLst>
   </p:cSld>
@@ -14687,10 +14933,10 @@
       </p:grpSpPr>
       <p:sp>
         <p:nvSpPr>
-          <p:cNvPr id="2" name="Titre 1">
-            <a:extLst>
-              <a:ext uri="{FF2B5EF4-FFF2-40B4-BE49-F238E27FC236}">
-                <a16:creationId xmlns:a16="http://schemas.microsoft.com/office/drawing/2014/main" id="{B6AB6C78-2C2A-B682-BA50-025D58CE21AD}"/>
+          <p:cNvPr id="4" name="Titre 3">
+            <a:extLst>
+              <a:ext uri="{FF2B5EF4-FFF2-40B4-BE49-F238E27FC236}">
+                <a16:creationId xmlns:a16="http://schemas.microsoft.com/office/drawing/2014/main" id="{783B5AB8-00B2-00C1-44A7-96E2271C8CB1}"/>
               </a:ext>
             </a:extLst>
           </p:cNvPr>
@@ -14711,17 +14957,17 @@
           <a:p>
             <a:r>
               <a:rPr lang="fr-FR"/>
-              <a:t>Objectifs de cette session</a:t>
-            </a:r>
-          </a:p>
-        </p:txBody>
-      </p:sp>
-      <p:sp>
-        <p:nvSpPr>
-          <p:cNvPr id="3" name="Espace réservé du contenu 2">
-            <a:extLst>
-              <a:ext uri="{FF2B5EF4-FFF2-40B4-BE49-F238E27FC236}">
-                <a16:creationId xmlns:a16="http://schemas.microsoft.com/office/drawing/2014/main" id="{CE7FACAB-468A-6B2C-3515-E9FBE64AA8DA}"/>
+              <a:t>Jour 1 : Fondements théoriques</a:t>
+            </a:r>
+          </a:p>
+        </p:txBody>
+      </p:sp>
+      <p:sp>
+        <p:nvSpPr>
+          <p:cNvPr id="3" name="Espace réservé du texte 2">
+            <a:extLst>
+              <a:ext uri="{FF2B5EF4-FFF2-40B4-BE49-F238E27FC236}">
+                <a16:creationId xmlns:a16="http://schemas.microsoft.com/office/drawing/2014/main" id="{BBB481A2-F525-8D0B-048B-EE53607194F1}"/>
               </a:ext>
             </a:extLst>
           </p:cNvPr>
@@ -14729,7 +14975,7 @@
             <a:spLocks noGrp="1"/>
           </p:cNvSpPr>
           <p:nvPr>
-            <p:ph idx="1"/>
+            <p:ph type="body" idx="1"/>
             <p:custDataLst>
               <p:tags r:id="rId2"/>
             </p:custDataLst>
@@ -14740,41 +14986,14 @@
           <a:bodyPr/>
           <a:lstStyle/>
           <a:p>
-            <a:r>
-              <a:rPr lang="fr-FR"/>
-              <a:t>Spécificité des évaluations d’impact dans la « boite à outils » évaluative</a:t>
-            </a:r>
-          </a:p>
-          <a:p>
-            <a:r>
-              <a:rPr lang="fr-FR"/>
-              <a:t>Enjeux de l’évaluation d’impact</a:t>
-            </a:r>
-          </a:p>
-          <a:p>
-            <a:r>
-              <a:rPr lang="fr-FR"/>
-              <a:t>Cadre d’analyse économétrique de la causalité : le cadre des résultats potentiels de Rubin</a:t>
-            </a:r>
-          </a:p>
-          <a:p>
-            <a:r>
-              <a:rPr lang="fr-FR"/>
-              <a:t>Affiner sa compréhension des mécanismes de causalité : diagrammes acycliques orientés et combinaisons quanti-quali</a:t>
-            </a:r>
-          </a:p>
-          <a:p>
-            <a:r>
-              <a:rPr lang="fr-FR"/>
-              <a:t>Tour d’horizon des principales méthodes d’évaluation d’impact </a:t>
-            </a:r>
+            <a:endParaRPr lang="fr-FR"/>
           </a:p>
         </p:txBody>
       </p:sp>
     </p:spTree>
     <p:extLst>
       <p:ext uri="{BB962C8B-B14F-4D97-AF65-F5344CB8AC3E}">
-        <p14:creationId xmlns:p14="http://schemas.microsoft.com/office/powerpoint/2010/main" val="2053272106"/>
+        <p14:creationId xmlns:p14="http://schemas.microsoft.com/office/powerpoint/2010/main" val="3329902575"/>
       </p:ext>
     </p:extLst>
   </p:cSld>

</xml_diff>

<commit_message>
Corrections des erreurs identifiées
</commit_message>
<xml_diff>
--- a/slides/fr/Jour 1_Introduction_Fondamentaux.pptx
+++ b/slides/fr/Jour 1_Introduction_Fondamentaux.pptx
@@ -240,7 +240,7 @@
           <a:p>
             <a:fld id="{382B4D05-7B27-4ACA-B390-629921E58724}" type="datetimeFigureOut">
               <a:rPr lang="fr-FR" smtClean="0"/>
-              <a:t>01/07/2025</a:t>
+              <a:t>03/07/2025</a:t>
             </a:fld>
             <a:endParaRPr lang="fr-FR"/>
           </a:p>
@@ -1002,7 +1002,7 @@
           <a:p>
             <a:fld id="{858D3960-AD67-4093-BD43-25B40AABDC13}" type="datetimeFigureOut">
               <a:rPr lang="fr-FR" smtClean="0"/>
-              <a:t>01/07/2025</a:t>
+              <a:t>03/07/2025</a:t>
             </a:fld>
             <a:endParaRPr lang="fr-FR"/>
           </a:p>
@@ -1200,7 +1200,7 @@
           <a:p>
             <a:fld id="{858D3960-AD67-4093-BD43-25B40AABDC13}" type="datetimeFigureOut">
               <a:rPr lang="fr-FR" smtClean="0"/>
-              <a:t>01/07/2025</a:t>
+              <a:t>03/07/2025</a:t>
             </a:fld>
             <a:endParaRPr lang="fr-FR"/>
           </a:p>
@@ -1408,7 +1408,7 @@
           <a:p>
             <a:fld id="{858D3960-AD67-4093-BD43-25B40AABDC13}" type="datetimeFigureOut">
               <a:rPr lang="fr-FR" smtClean="0"/>
-              <a:t>01/07/2025</a:t>
+              <a:t>03/07/2025</a:t>
             </a:fld>
             <a:endParaRPr lang="fr-FR"/>
           </a:p>
@@ -1606,7 +1606,7 @@
           <a:p>
             <a:fld id="{858D3960-AD67-4093-BD43-25B40AABDC13}" type="datetimeFigureOut">
               <a:rPr lang="fr-FR" smtClean="0"/>
-              <a:t>01/07/2025</a:t>
+              <a:t>03/07/2025</a:t>
             </a:fld>
             <a:endParaRPr lang="fr-FR"/>
           </a:p>
@@ -1885,7 +1885,7 @@
           <a:p>
             <a:fld id="{858D3960-AD67-4093-BD43-25B40AABDC13}" type="datetimeFigureOut">
               <a:rPr lang="fr-FR" smtClean="0"/>
-              <a:t>01/07/2025</a:t>
+              <a:t>03/07/2025</a:t>
             </a:fld>
             <a:endParaRPr lang="fr-FR"/>
           </a:p>
@@ -2150,7 +2150,7 @@
           <a:p>
             <a:fld id="{858D3960-AD67-4093-BD43-25B40AABDC13}" type="datetimeFigureOut">
               <a:rPr lang="fr-FR" smtClean="0"/>
-              <a:t>01/07/2025</a:t>
+              <a:t>03/07/2025</a:t>
             </a:fld>
             <a:endParaRPr lang="fr-FR"/>
           </a:p>
@@ -2562,7 +2562,7 @@
           <a:p>
             <a:fld id="{858D3960-AD67-4093-BD43-25B40AABDC13}" type="datetimeFigureOut">
               <a:rPr lang="fr-FR" smtClean="0"/>
-              <a:t>01/07/2025</a:t>
+              <a:t>03/07/2025</a:t>
             </a:fld>
             <a:endParaRPr lang="fr-FR"/>
           </a:p>
@@ -2703,7 +2703,7 @@
           <a:p>
             <a:fld id="{858D3960-AD67-4093-BD43-25B40AABDC13}" type="datetimeFigureOut">
               <a:rPr lang="fr-FR" smtClean="0"/>
-              <a:t>01/07/2025</a:t>
+              <a:t>03/07/2025</a:t>
             </a:fld>
             <a:endParaRPr lang="fr-FR"/>
           </a:p>
@@ -2816,7 +2816,7 @@
           <a:p>
             <a:fld id="{858D3960-AD67-4093-BD43-25B40AABDC13}" type="datetimeFigureOut">
               <a:rPr lang="fr-FR" smtClean="0"/>
-              <a:t>01/07/2025</a:t>
+              <a:t>03/07/2025</a:t>
             </a:fld>
             <a:endParaRPr lang="fr-FR"/>
           </a:p>
@@ -3127,7 +3127,7 @@
           <a:p>
             <a:fld id="{858D3960-AD67-4093-BD43-25B40AABDC13}" type="datetimeFigureOut">
               <a:rPr lang="fr-FR" smtClean="0"/>
-              <a:t>01/07/2025</a:t>
+              <a:t>03/07/2025</a:t>
             </a:fld>
             <a:endParaRPr lang="fr-FR"/>
           </a:p>
@@ -3415,7 +3415,7 @@
           <a:p>
             <a:fld id="{858D3960-AD67-4093-BD43-25B40AABDC13}" type="datetimeFigureOut">
               <a:rPr lang="fr-FR" smtClean="0"/>
-              <a:t>01/07/2025</a:t>
+              <a:t>03/07/2025</a:t>
             </a:fld>
             <a:endParaRPr lang="fr-FR"/>
           </a:p>
@@ -3656,7 +3656,7 @@
           <a:p>
             <a:fld id="{858D3960-AD67-4093-BD43-25B40AABDC13}" type="datetimeFigureOut">
               <a:rPr lang="fr-FR" smtClean="0"/>
-              <a:t>01/07/2025</a:t>
+              <a:t>03/07/2025</a:t>
             </a:fld>
             <a:endParaRPr lang="fr-FR"/>
           </a:p>
@@ -8226,7 +8226,7 @@
             </a:pPr>
             <a:fld id="{F9B19538-8328-489B-B6DE-FCE852F32308}" type="datetime1">
               <a:rPr lang="fr-FR" smtClean="0"/>
-              <a:t>01/07/2025</a:t>
+              <a:t>03/07/2025</a:t>
             </a:fld>
             <a:endParaRPr lang="fr-FR"/>
           </a:p>
@@ -12233,8 +12233,8 @@
           </a:prstGeom>
         </p:spPr>
       </p:pic>
-      <mc:AlternateContent xmlns:mc="http://schemas.openxmlformats.org/markup-compatibility/2006" xmlns:a14="http://schemas.microsoft.com/office/drawing/2010/main">
-        <mc:Choice Requires="a14">
+      <mc:AlternateContent xmlns:mc="http://schemas.openxmlformats.org/markup-compatibility/2006">
+        <mc:Choice xmlns:a14="http://schemas.microsoft.com/office/drawing/2010/main" Requires="a14">
           <p:sp>
             <p:nvSpPr>
               <p:cNvPr id="10" name="ZoneTexte 9">
@@ -12254,7 +12254,7 @@
             <p:spPr>
               <a:xfrm>
                 <a:off x="130834" y="5054488"/>
-                <a:ext cx="12082731" cy="892552"/>
+                <a:ext cx="10289292" cy="892552"/>
               </a:xfrm>
               <a:prstGeom prst="rect">
                 <a:avLst/>
@@ -12556,68 +12556,6 @@
                         </m:sSubPr>
                         <m:e>
                           <m:r>
-                            <a:rPr lang="el-GR" sz="2600">
-                              <a:latin typeface="Cambria Math" panose="02040503050406030204" pitchFamily="18" charset="0"/>
-                            </a:rPr>
-                            <m:t>𝛾</m:t>
-                          </m:r>
-                        </m:e>
-                        <m:sub>
-                          <m:r>
-                            <a:rPr lang="fr-FR" sz="2600" smtClean="0">
-                              <a:latin typeface="Cambria Math" panose="02040503050406030204" pitchFamily="18" charset="0"/>
-                            </a:rPr>
-                            <m:t>4</m:t>
-                          </m:r>
-                        </m:sub>
-                      </m:sSub>
-                      <m:r>
-                        <a:rPr lang="el-GR" sz="2600" smtClean="0">
-                          <a:latin typeface="Cambria Math" panose="02040503050406030204" pitchFamily="18" charset="0"/>
-                        </a:rPr>
-                        <m:t>​×</m:t>
-                      </m:r>
-                      <m:sSub>
-                        <m:sSubPr>
-                          <m:ctrlPr>
-                            <a:rPr lang="el-GR" sz="2600" i="1" smtClean="0">
-                              <a:latin typeface="Cambria Math" panose="02040503050406030204" pitchFamily="18" charset="0"/>
-                            </a:rPr>
-                          </m:ctrlPr>
-                        </m:sSubPr>
-                        <m:e>
-                          <m:r>
-                            <a:rPr lang="fr-FR" sz="2600" smtClean="0">
-                              <a:latin typeface="Cambria Math" panose="02040503050406030204" pitchFamily="18" charset="0"/>
-                            </a:rPr>
-                            <m:t>𝐽𝑜𝑏𝐶𝑥</m:t>
-                          </m:r>
-                        </m:e>
-                        <m:sub>
-                          <m:r>
-                            <a:rPr lang="fr-FR" sz="2600" smtClean="0">
-                              <a:latin typeface="Cambria Math" panose="02040503050406030204" pitchFamily="18" charset="0"/>
-                            </a:rPr>
-                            <m:t>𝑖</m:t>
-                          </m:r>
-                        </m:sub>
-                      </m:sSub>
-                      <m:r>
-                        <a:rPr lang="fr-FR" sz="2600" smtClean="0">
-                          <a:latin typeface="Cambria Math" panose="02040503050406030204" pitchFamily="18" charset="0"/>
-                        </a:rPr>
-                        <m:t>​+</m:t>
-                      </m:r>
-                      <m:sSub>
-                        <m:sSubPr>
-                          <m:ctrlPr>
-                            <a:rPr lang="fr-FR" sz="2600" i="1" smtClean="0">
-                              <a:latin typeface="Cambria Math" panose="02040503050406030204" pitchFamily="18" charset="0"/>
-                            </a:rPr>
-                          </m:ctrlPr>
-                        </m:sSubPr>
-                        <m:e>
-                          <m:r>
                             <a:rPr lang="fr-FR" sz="2600" smtClean="0">
                               <a:latin typeface="Cambria Math" panose="02040503050406030204" pitchFamily="18" charset="0"/>
                             </a:rPr>
@@ -12650,7 +12588,7 @@
             </p:txBody>
           </p:sp>
         </mc:Choice>
-        <mc:Fallback xmlns="">
+        <mc:Fallback>
           <p:sp>
             <p:nvSpPr>
               <p:cNvPr id="10" name="ZoneTexte 9">
@@ -12665,20 +12603,20 @@
               </p:cNvSpPr>
               <p:nvPr>
                 <p:custDataLst>
-                  <p:tags r:id="rId9"/>
+                  <p:tags r:id="rId5"/>
                 </p:custDataLst>
               </p:nvPr>
             </p:nvSpPr>
             <p:spPr>
               <a:xfrm>
                 <a:off x="130834" y="5054488"/>
-                <a:ext cx="12082731" cy="892552"/>
+                <a:ext cx="10289292" cy="892552"/>
               </a:xfrm>
               <a:prstGeom prst="rect">
                 <a:avLst/>
               </a:prstGeom>
               <a:blipFill>
-                <a:blip r:embed="rId10"/>
+                <a:blip r:embed="rId9"/>
                 <a:stretch>
                   <a:fillRect/>
                 </a:stretch>
@@ -14627,60 +14565,190 @@
           </a:p>
         </p:txBody>
       </p:sp>
-      <p:sp>
-        <p:nvSpPr>
-          <p:cNvPr id="5" name="Espace réservé du contenu 4">
-            <a:extLst>
-              <a:ext uri="{FF2B5EF4-FFF2-40B4-BE49-F238E27FC236}">
-                <a16:creationId xmlns:a16="http://schemas.microsoft.com/office/drawing/2014/main" id="{7A3FACC0-537F-782B-052E-09987723757E}"/>
-              </a:ext>
-            </a:extLst>
-          </p:cNvPr>
-          <p:cNvSpPr>
-            <a:spLocks noGrp="1"/>
-          </p:cNvSpPr>
-          <p:nvPr>
-            <p:ph idx="1"/>
-            <p:custDataLst>
-              <p:tags r:id="rId2"/>
-            </p:custDataLst>
-          </p:nvPr>
-        </p:nvSpPr>
-        <p:spPr/>
-        <p:txBody>
-          <a:bodyPr/>
-          <a:lstStyle/>
-          <a:p>
-            <a:r>
-              <a:rPr lang="fr-FR"/>
-              <a:t>Le problème fondamental de l'identification causale : seulement un des deux résultats potentiels (Y1i ou Y0i) peut être observé pour l'individu i</a:t>
-            </a:r>
-          </a:p>
-          <a:p>
-            <a:r>
-              <a:rPr lang="fr-FR"/>
-              <a:t>Idéalement, il faudrait pouvoir comparer le résultat de l'individu traité au résultat qu'il aurait obtenu en l'absence de traitement : </a:t>
-            </a:r>
-          </a:p>
-          <a:p>
-            <a:pPr lvl="1"/>
-            <a:r>
-              <a:rPr lang="fr-FR"/>
-              <a:t>C'est la définition du </a:t>
-            </a:r>
-            <a:r>
-              <a:rPr lang="fr-FR" b="1"/>
-              <a:t>contrefactuel</a:t>
-            </a:r>
-          </a:p>
-          <a:p>
-            <a:r>
-              <a:rPr lang="fr-FR"/>
-              <a:t>Comment constituer ce contrefactuel ? Une solution hypothétique : le clonage ? Des mondes parallèles ?</a:t>
-            </a:r>
-          </a:p>
-        </p:txBody>
-      </p:sp>
+      <mc:AlternateContent xmlns:mc="http://schemas.openxmlformats.org/markup-compatibility/2006">
+        <mc:Choice xmlns:a14="http://schemas.microsoft.com/office/drawing/2010/main" Requires="a14">
+          <p:sp>
+            <p:nvSpPr>
+              <p:cNvPr id="5" name="Espace réservé du contenu 4">
+                <a:extLst>
+                  <a:ext uri="{FF2B5EF4-FFF2-40B4-BE49-F238E27FC236}">
+                    <a16:creationId xmlns:a16="http://schemas.microsoft.com/office/drawing/2014/main" id="{7A3FACC0-537F-782B-052E-09987723757E}"/>
+                  </a:ext>
+                </a:extLst>
+              </p:cNvPr>
+              <p:cNvSpPr>
+                <a:spLocks noGrp="1"/>
+              </p:cNvSpPr>
+              <p:nvPr>
+                <p:ph idx="1"/>
+                <p:custDataLst>
+                  <p:tags r:id="rId2"/>
+                </p:custDataLst>
+              </p:nvPr>
+            </p:nvSpPr>
+            <p:spPr/>
+            <p:txBody>
+              <a:bodyPr/>
+              <a:lstStyle/>
+              <a:p>
+                <a:r>
+                  <a:rPr lang="fr-FR"/>
+                  <a:t>Le problème fondamental de l'identification causale : seulement un des deux résultats potentiels (</a:t>
+                </a:r>
+                <a14:m>
+                  <m:oMath xmlns:m="http://schemas.openxmlformats.org/officeDocument/2006/math">
+                    <m:sSub>
+                      <m:sSubPr>
+                        <m:ctrlPr>
+                          <a:rPr lang="fr-FR" i="1" smtClean="0">
+                            <a:latin typeface="Cambria Math" panose="02040503050406030204" pitchFamily="18" charset="0"/>
+                          </a:rPr>
+                        </m:ctrlPr>
+                      </m:sSubPr>
+                      <m:e>
+                        <m:r>
+                          <a:rPr lang="fr-FR" b="0" i="1" smtClean="0">
+                            <a:latin typeface="Cambria Math" panose="02040503050406030204" pitchFamily="18" charset="0"/>
+                          </a:rPr>
+                          <m:t>𝑌</m:t>
+                        </m:r>
+                        <m:r>
+                          <a:rPr lang="fr-FR" b="0" i="1" smtClean="0">
+                            <a:latin typeface="Cambria Math" panose="02040503050406030204" pitchFamily="18" charset="0"/>
+                          </a:rPr>
+                          <m:t>1</m:t>
+                        </m:r>
+                      </m:e>
+                      <m:sub>
+                        <m:r>
+                          <a:rPr lang="fr-FR" b="0" i="1" smtClean="0">
+                            <a:latin typeface="Cambria Math" panose="02040503050406030204" pitchFamily="18" charset="0"/>
+                          </a:rPr>
+                          <m:t>𝑖</m:t>
+                        </m:r>
+                      </m:sub>
+                    </m:sSub>
+                    <m:r>
+                      <a:rPr lang="fr-FR" b="0" i="1" smtClean="0">
+                        <a:latin typeface="Cambria Math" panose="02040503050406030204" pitchFamily="18" charset="0"/>
+                      </a:rPr>
+                      <m:t> </m:t>
+                    </m:r>
+                  </m:oMath>
+                </a14:m>
+                <a:r>
+                  <a:rPr lang="fr-FR"/>
+                  <a:t>ou </a:t>
+                </a:r>
+                <a14:m>
+                  <m:oMath xmlns:m="http://schemas.openxmlformats.org/officeDocument/2006/math">
+                    <m:sSub>
+                      <m:sSubPr>
+                        <m:ctrlPr>
+                          <a:rPr lang="fr-FR" i="1">
+                            <a:latin typeface="Cambria Math" panose="02040503050406030204" pitchFamily="18" charset="0"/>
+                          </a:rPr>
+                        </m:ctrlPr>
+                      </m:sSubPr>
+                      <m:e>
+                        <m:r>
+                          <a:rPr lang="fr-FR" i="1">
+                            <a:latin typeface="Cambria Math" panose="02040503050406030204" pitchFamily="18" charset="0"/>
+                          </a:rPr>
+                          <m:t>𝑌</m:t>
+                        </m:r>
+                        <m:r>
+                          <a:rPr lang="fr-FR" i="1">
+                            <a:latin typeface="Cambria Math" panose="02040503050406030204" pitchFamily="18" charset="0"/>
+                          </a:rPr>
+                          <m:t>0</m:t>
+                        </m:r>
+                      </m:e>
+                      <m:sub>
+                        <m:r>
+                          <a:rPr lang="fr-FR" i="1">
+                            <a:latin typeface="Cambria Math" panose="02040503050406030204" pitchFamily="18" charset="0"/>
+                          </a:rPr>
+                          <m:t>𝑖</m:t>
+                        </m:r>
+                      </m:sub>
+                    </m:sSub>
+                  </m:oMath>
+                </a14:m>
+                <a:r>
+                  <a:rPr lang="fr-FR"/>
+                  <a:t>) peut être observé pour l'individu i</a:t>
+                </a:r>
+              </a:p>
+              <a:p>
+                <a:r>
+                  <a:rPr lang="fr-FR"/>
+                  <a:t>Idéalement, il faudrait pouvoir comparer le résultat de l'individu traité au résultat qu'il aurait obtenu en l'absence de traitement : </a:t>
+                </a:r>
+              </a:p>
+              <a:p>
+                <a:pPr lvl="1"/>
+                <a:r>
+                  <a:rPr lang="fr-FR"/>
+                  <a:t>C'est la définition du </a:t>
+                </a:r>
+                <a:r>
+                  <a:rPr lang="fr-FR" b="1"/>
+                  <a:t>contrefactuel</a:t>
+                </a:r>
+              </a:p>
+              <a:p>
+                <a:r>
+                  <a:rPr lang="fr-FR"/>
+                  <a:t>Comment constituer ce contrefactuel ? Une solution hypothétique : le clonage ? Des mondes parallèles ?</a:t>
+                </a:r>
+              </a:p>
+            </p:txBody>
+          </p:sp>
+        </mc:Choice>
+        <mc:Fallback>
+          <p:sp>
+            <p:nvSpPr>
+              <p:cNvPr id="5" name="Espace réservé du contenu 4">
+                <a:extLst>
+                  <a:ext uri="{FF2B5EF4-FFF2-40B4-BE49-F238E27FC236}">
+                    <a16:creationId xmlns:a16="http://schemas.microsoft.com/office/drawing/2014/main" id="{7A3FACC0-537F-782B-052E-09987723757E}"/>
+                  </a:ext>
+                </a:extLst>
+              </p:cNvPr>
+              <p:cNvSpPr>
+                <a:spLocks noGrp="1" noRot="1" noChangeAspect="1" noMove="1" noResize="1" noEditPoints="1" noAdjustHandles="1" noChangeArrowheads="1" noChangeShapeType="1" noTextEdit="1"/>
+              </p:cNvSpPr>
+              <p:nvPr>
+                <p:ph idx="1"/>
+                <p:custDataLst>
+                  <p:tags r:id="rId2"/>
+                </p:custDataLst>
+              </p:nvPr>
+            </p:nvSpPr>
+            <p:spPr>
+              <a:blipFill>
+                <a:blip r:embed="rId4"/>
+                <a:stretch>
+                  <a:fillRect l="-1043" t="-2241" r="-1797"/>
+                </a:stretch>
+              </a:blipFill>
+            </p:spPr>
+            <p:txBody>
+              <a:bodyPr/>
+              <a:lstStyle/>
+              <a:p>
+                <a:r>
+                  <a:rPr lang="fr-FR">
+                    <a:noFill/>
+                  </a:rPr>
+                  <a:t> </a:t>
+                </a:r>
+              </a:p>
+            </p:txBody>
+          </p:sp>
+        </mc:Fallback>
+      </mc:AlternateContent>
     </p:spTree>
     <p:extLst>
       <p:ext uri="{BB962C8B-B14F-4D97-AF65-F5344CB8AC3E}">
@@ -15368,96 +15436,184 @@
           </a:p>
         </p:txBody>
       </p:sp>
-      <p:sp>
-        <p:nvSpPr>
-          <p:cNvPr id="3" name="Espace réservé du contenu 2">
-            <a:extLst>
-              <a:ext uri="{FF2B5EF4-FFF2-40B4-BE49-F238E27FC236}">
-                <a16:creationId xmlns:a16="http://schemas.microsoft.com/office/drawing/2014/main" id="{71856BAB-D6FF-156E-9A26-2F26854BA5EA}"/>
-              </a:ext>
-            </a:extLst>
-          </p:cNvPr>
-          <p:cNvSpPr>
-            <a:spLocks noGrp="1"/>
-          </p:cNvSpPr>
-          <p:nvPr>
-            <p:ph idx="1"/>
-            <p:custDataLst>
-              <p:tags r:id="rId2"/>
-            </p:custDataLst>
-          </p:nvPr>
-        </p:nvSpPr>
-        <p:spPr/>
-        <p:txBody>
-          <a:bodyPr>
-            <a:normAutofit lnSpcReduction="10000"/>
-          </a:bodyPr>
-          <a:lstStyle/>
-          <a:p>
-            <a:r>
-              <a:rPr lang="fr-FR"/>
-              <a:t>Le défi empirique devient alors de constituer un </a:t>
-            </a:r>
-            <a:r>
-              <a:rPr lang="fr-FR" b="1"/>
-              <a:t>contrefactuel pertinent et valide</a:t>
-            </a:r>
-            <a:r>
-              <a:rPr lang="fr-FR"/>
-              <a:t>, c.-à-d. qui se rapproche le plus possible de ce qu'aurait été la situation de l'unité traitée en l'absence de traitement</a:t>
-            </a:r>
-          </a:p>
-          <a:p>
-            <a:r>
-              <a:rPr lang="fr-FR"/>
-              <a:t>Nécessiter de changer d'échelle dans l'approche contrefactuelle :</a:t>
-            </a:r>
-          </a:p>
-          <a:p>
-            <a:pPr marL="0" indent="0" algn="ctr">
-              <a:buNone/>
-            </a:pPr>
-            <a:r>
-              <a:rPr lang="fr-FR" b="1"/>
-              <a:t>Niveau de l'unité </a:t>
-            </a:r>
-            <a:r>
-              <a:rPr lang="fr-FR" b="1">
-                <a:sym typeface="Wingdings" panose="05000000000000000000" pitchFamily="2" charset="2"/>
-              </a:rPr>
-              <a:t></a:t>
-            </a:r>
-            <a:r>
-              <a:rPr lang="fr-FR"/>
-              <a:t> </a:t>
-            </a:r>
-            <a:r>
-              <a:rPr lang="fr-FR" b="1"/>
-              <a:t>Niveau d'un groupe d'unités</a:t>
-            </a:r>
-          </a:p>
-          <a:p>
-            <a:r>
-              <a:rPr lang="fr-FR"/>
-              <a:t>Comme l'estimation de l'effet du traitement individuel (Dyi) n'est pas possible, on se concentre sur l'</a:t>
-            </a:r>
-            <a:r>
-              <a:rPr lang="fr-FR" b="1"/>
-              <a:t>effet moyen du traitement </a:t>
-            </a:r>
-            <a:r>
-              <a:rPr lang="fr-FR"/>
-              <a:t>(average treatement effect : ATE)</a:t>
-            </a:r>
-          </a:p>
-          <a:p>
-            <a:r>
-              <a:rPr lang="fr-FR"/>
-              <a:t>Impossible de trouver deux unités identique, mais possible de trouver deux groupes statistiquement proches, voire identiques en moyenne</a:t>
-            </a:r>
-          </a:p>
-        </p:txBody>
-      </p:sp>
+      <mc:AlternateContent xmlns:mc="http://schemas.openxmlformats.org/markup-compatibility/2006">
+        <mc:Choice xmlns:a14="http://schemas.microsoft.com/office/drawing/2010/main" Requires="a14">
+          <p:sp>
+            <p:nvSpPr>
+              <p:cNvPr id="3" name="Espace réservé du contenu 2">
+                <a:extLst>
+                  <a:ext uri="{FF2B5EF4-FFF2-40B4-BE49-F238E27FC236}">
+                    <a16:creationId xmlns:a16="http://schemas.microsoft.com/office/drawing/2014/main" id="{71856BAB-D6FF-156E-9A26-2F26854BA5EA}"/>
+                  </a:ext>
+                </a:extLst>
+              </p:cNvPr>
+              <p:cNvSpPr>
+                <a:spLocks noGrp="1"/>
+              </p:cNvSpPr>
+              <p:nvPr>
+                <p:ph idx="1"/>
+                <p:custDataLst>
+                  <p:tags r:id="rId2"/>
+                </p:custDataLst>
+              </p:nvPr>
+            </p:nvSpPr>
+            <p:spPr/>
+            <p:txBody>
+              <a:bodyPr>
+                <a:normAutofit lnSpcReduction="10000"/>
+              </a:bodyPr>
+              <a:lstStyle/>
+              <a:p>
+                <a:r>
+                  <a:rPr lang="fr-FR"/>
+                  <a:t>Le défi empirique devient alors de constituer un </a:t>
+                </a:r>
+                <a:r>
+                  <a:rPr lang="fr-FR" b="1"/>
+                  <a:t>contrefactuel pertinent et valide</a:t>
+                </a:r>
+                <a:r>
+                  <a:rPr lang="fr-FR"/>
+                  <a:t>, c.-à-d. qui se rapproche le plus possible de ce qu'aurait été la situation de l'unité traitée en l'absence de traitement</a:t>
+                </a:r>
+              </a:p>
+              <a:p>
+                <a:r>
+                  <a:rPr lang="fr-FR"/>
+                  <a:t>Nécessiter de changer d'échelle dans l'approche contrefactuelle :</a:t>
+                </a:r>
+              </a:p>
+              <a:p>
+                <a:pPr marL="0" indent="0" algn="ctr">
+                  <a:buNone/>
+                </a:pPr>
+                <a:r>
+                  <a:rPr lang="fr-FR" b="1"/>
+                  <a:t>Niveau de l'unité </a:t>
+                </a:r>
+                <a:r>
+                  <a:rPr lang="fr-FR" b="1">
+                    <a:sym typeface="Wingdings" panose="05000000000000000000" pitchFamily="2" charset="2"/>
+                  </a:rPr>
+                  <a:t></a:t>
+                </a:r>
+                <a:r>
+                  <a:rPr lang="fr-FR"/>
+                  <a:t> </a:t>
+                </a:r>
+                <a:r>
+                  <a:rPr lang="fr-FR" b="1"/>
+                  <a:t>Niveau d'un groupe d'unités</a:t>
+                </a:r>
+              </a:p>
+              <a:p>
+                <a:r>
+                  <a:rPr lang="fr-FR"/>
+                  <a:t>Comme l'estimation de l'effet du traitement individuel (</a:t>
+                </a:r>
+                <a14:m>
+                  <m:oMath xmlns:m="http://schemas.openxmlformats.org/officeDocument/2006/math">
+                    <m:r>
+                      <m:rPr>
+                        <m:sty m:val="p"/>
+                      </m:rPr>
+                      <a:rPr lang="fr-FR" i="0" smtClean="0">
+                        <a:latin typeface="Cambria Math" panose="02040503050406030204" pitchFamily="18" charset="0"/>
+                      </a:rPr>
+                      <m:t>Δ</m:t>
+                    </m:r>
+                    <m:sSub>
+                      <m:sSubPr>
+                        <m:ctrlPr>
+                          <a:rPr lang="fr-FR" i="1" smtClean="0">
+                            <a:latin typeface="Cambria Math" panose="02040503050406030204" pitchFamily="18" charset="0"/>
+                          </a:rPr>
+                        </m:ctrlPr>
+                      </m:sSubPr>
+                      <m:e>
+                        <m:r>
+                          <a:rPr lang="fr-FR" b="0" i="1" smtClean="0">
+                            <a:latin typeface="Cambria Math" panose="02040503050406030204" pitchFamily="18" charset="0"/>
+                          </a:rPr>
+                          <m:t>𝑌</m:t>
+                        </m:r>
+                      </m:e>
+                      <m:sub>
+                        <m:r>
+                          <a:rPr lang="fr-FR" b="0" i="1" smtClean="0">
+                            <a:latin typeface="Cambria Math" panose="02040503050406030204" pitchFamily="18" charset="0"/>
+                          </a:rPr>
+                          <m:t>𝑖</m:t>
+                        </m:r>
+                      </m:sub>
+                    </m:sSub>
+                  </m:oMath>
+                </a14:m>
+                <a:r>
+                  <a:rPr lang="fr-FR"/>
+                  <a:t> ) n'est pas possible, on se concentre sur l'</a:t>
+                </a:r>
+                <a:r>
+                  <a:rPr lang="fr-FR" b="1"/>
+                  <a:t>effet moyen du traitement </a:t>
+                </a:r>
+                <a:r>
+                  <a:rPr lang="fr-FR"/>
+                  <a:t>(average treatement effect : ATE)</a:t>
+                </a:r>
+              </a:p>
+              <a:p>
+                <a:r>
+                  <a:rPr lang="fr-FR"/>
+                  <a:t>Impossible de trouver deux unités identique, mais possible de trouver deux groupes statistiquement proches, voire identiques en moyenne</a:t>
+                </a:r>
+              </a:p>
+            </p:txBody>
+          </p:sp>
+        </mc:Choice>
+        <mc:Fallback>
+          <p:sp>
+            <p:nvSpPr>
+              <p:cNvPr id="3" name="Espace réservé du contenu 2">
+                <a:extLst>
+                  <a:ext uri="{FF2B5EF4-FFF2-40B4-BE49-F238E27FC236}">
+                    <a16:creationId xmlns:a16="http://schemas.microsoft.com/office/drawing/2014/main" id="{71856BAB-D6FF-156E-9A26-2F26854BA5EA}"/>
+                  </a:ext>
+                </a:extLst>
+              </p:cNvPr>
+              <p:cNvSpPr>
+                <a:spLocks noGrp="1" noRot="1" noChangeAspect="1" noMove="1" noResize="1" noEditPoints="1" noAdjustHandles="1" noChangeArrowheads="1" noChangeShapeType="1" noTextEdit="1"/>
+              </p:cNvSpPr>
+              <p:nvPr>
+                <p:ph idx="1"/>
+                <p:custDataLst>
+                  <p:tags r:id="rId2"/>
+                </p:custDataLst>
+              </p:nvPr>
+            </p:nvSpPr>
+            <p:spPr>
+              <a:blipFill>
+                <a:blip r:embed="rId4"/>
+                <a:stretch>
+                  <a:fillRect l="-1043" t="-3081" r="-1565"/>
+                </a:stretch>
+              </a:blipFill>
+            </p:spPr>
+            <p:txBody>
+              <a:bodyPr/>
+              <a:lstStyle/>
+              <a:p>
+                <a:r>
+                  <a:rPr lang="fr-FR">
+                    <a:noFill/>
+                  </a:rPr>
+                  <a:t> </a:t>
+                </a:r>
+              </a:p>
+            </p:txBody>
+          </p:sp>
+        </mc:Fallback>
+      </mc:AlternateContent>
     </p:spTree>
     <p:extLst>
       <p:ext uri="{BB962C8B-B14F-4D97-AF65-F5344CB8AC3E}">
@@ -17352,8 +17508,8 @@
           </a:prstGeom>
         </p:spPr>
       </p:pic>
-      <mc:AlternateContent xmlns:mc="http://schemas.openxmlformats.org/markup-compatibility/2006" xmlns:a14="http://schemas.microsoft.com/office/drawing/2010/main">
-        <mc:Choice Requires="a14">
+      <mc:AlternateContent xmlns:mc="http://schemas.openxmlformats.org/markup-compatibility/2006">
+        <mc:Choice xmlns:a14="http://schemas.microsoft.com/office/drawing/2010/main" Requires="a14">
           <p:sp>
             <p:nvSpPr>
               <p:cNvPr id="38" name="Espace réservé du contenu 3">
@@ -17375,7 +17531,7 @@
             <p:spPr>
               <a:xfrm>
                 <a:off x="6314450" y="5079998"/>
-                <a:ext cx="5181600" cy="1096963"/>
+                <a:ext cx="5278460" cy="1096963"/>
               </a:xfrm>
               <a:prstGeom prst="rect">
                 <a:avLst/>
@@ -17383,7 +17539,7 @@
             </p:spPr>
             <p:txBody>
               <a:bodyPr vert="horz" lIns="91440" tIns="45720" rIns="91440" bIns="45720" rtlCol="0">
-                <a:normAutofit/>
+                <a:normAutofit fontScale="92500"/>
               </a:bodyPr>
               <a:lstStyle>
                 <a:lvl1pPr marL="228600" indent="-228600" algn="l" defTabSz="914400" rtl="0" eaLnBrk="1" latinLnBrk="0" hangingPunct="1">
@@ -17556,7 +17712,7 @@
                 </a:pPr>
                 <a:r>
                   <a:rPr lang="fr-FR"/>
-                  <a:t>Résultat moyen des bénéficiaires</a:t>
+                  <a:t>Résultat moyen des non-bénéficiaires</a:t>
                 </a:r>
               </a:p>
               <a:p>
@@ -17822,7 +17978,7 @@
             </p:txBody>
           </p:sp>
         </mc:Choice>
-        <mc:Fallback xmlns="">
+        <mc:Fallback>
           <p:sp>
             <p:nvSpPr>
               <p:cNvPr id="38" name="Espace réservé du contenu 3">
@@ -17837,22 +17993,22 @@
               </p:cNvSpPr>
               <p:nvPr>
                 <p:custDataLst>
-                  <p:tags r:id="rId77"/>
+                  <p:tags r:id="rId36"/>
                 </p:custDataLst>
               </p:nvPr>
             </p:nvSpPr>
             <p:spPr>
               <a:xfrm>
                 <a:off x="6314450" y="5079998"/>
-                <a:ext cx="5181600" cy="1096963"/>
+                <a:ext cx="5278460" cy="1096963"/>
               </a:xfrm>
               <a:prstGeom prst="rect">
                 <a:avLst/>
               </a:prstGeom>
               <a:blipFill>
-                <a:blip r:embed="rId78"/>
+                <a:blip r:embed="rId77"/>
                 <a:stretch>
-                  <a:fillRect l="-588" t="-8889"/>
+                  <a:fillRect l="-1155" t="-8333" r="-1155"/>
                 </a:stretch>
               </a:blipFill>
             </p:spPr>
@@ -20650,7 +20806,7 @@
             <a:pPr lvl="1"/>
             <a:r>
               <a:rPr lang="fr-FR" sz="2800"/>
-              <a:t>Cette approche de contrefactuel vous semble-t-elle pertinente pour vos travaux ? Avez-vous déjà rencontré ou utilisé des méthodes s'appuyant sur cette approche contrefactuelle</a:t>
+              <a:t>Revenez sur les cas pratiques que vous avez identifiés et précisez cette idée en imaginant un contrefactuel qui permettrait de l'évaluer.</a:t>
             </a:r>
           </a:p>
         </p:txBody>
@@ -22216,7 +22372,7 @@
           <a:p>
             <a:r>
               <a:rPr lang="fr-FR"/>
-              <a:t>Que vous inspirent ces approches ?</a:t>
+              <a:t>Quelles méthodes vous sembleraient pouvoir s'appliquer à votre cas pratique ?</a:t>
             </a:r>
           </a:p>
         </p:txBody>
@@ -24226,12 +24382,6 @@
 <file path=ppt/tags/tag154.xml><?xml version="1.0" encoding="utf-8"?>
 <p:tagLst xmlns:a="http://schemas.openxmlformats.org/drawingml/2006/main" xmlns:r="http://schemas.openxmlformats.org/officeDocument/2006/relationships" xmlns:p="http://schemas.openxmlformats.org/presentationml/2006/main">
   <p:tag name="NUM" val="30"/>
-</p:tagLst>
-</file>
-
-<file path=ppt/tags/tag1540.xml><?xml version="1.0" encoding="utf-8"?>
-<p:tagLst xmlns:a="http://schemas.openxmlformats.org/drawingml/2006/main" xmlns:r="http://schemas.openxmlformats.org/officeDocument/2006/relationships" xmlns:p="http://schemas.openxmlformats.org/presentationml/2006/main">
-  <p:tag name="NUM" val="36"/>
 </p:tagLst>
 </file>
 

</xml_diff>